<commit_message>
tweaded day1, updated agenda, deleted email
</commit_message>
<xml_diff>
--- a/slides/day1.pptx
+++ b/slides/day1.pptx
@@ -621,7 +621,7 @@
           <a:p>
             <a:fld id="{9D8A2B0D-E315-41D0-B099-3ED602A8C128}" type="datetimeFigureOut">
               <a:rPr lang="en-US" smtClean="0"/>
-              <a:t>6/28/2023</a:t>
+              <a:t>7/13/2023</a:t>
             </a:fld>
             <a:endParaRPr lang="en-US"/>
           </a:p>
@@ -1968,7 +1968,7 @@
           <a:p>
             <a:fld id="{9D8A2B0D-E315-41D0-B099-3ED602A8C128}" type="datetimeFigureOut">
               <a:rPr lang="en-US" smtClean="0"/>
-              <a:t>6/28/2023</a:t>
+              <a:t>7/13/2023</a:t>
             </a:fld>
             <a:endParaRPr lang="en-US"/>
           </a:p>
@@ -3054,7 +3054,7 @@
         </p:spPr>
         <p:txBody>
           <a:bodyPr>
-            <a:normAutofit/>
+            <a:normAutofit lnSpcReduction="10000"/>
           </a:bodyPr>
           <a:lstStyle/>
           <a:p>
@@ -3097,6 +3097,12 @@
             <a:r>
               <a:rPr lang="en-US"/>
               <a:t>Year 4 Extension Approved Spring 2022</a:t>
+            </a:r>
+          </a:p>
+          <a:p>
+            <a:r>
+              <a:rPr lang="en-US"/>
+              <a:t>Investigating Year 5 NCE</a:t>
             </a:r>
           </a:p>
         </p:txBody>

</xml_diff>

<commit_message>
added day 1 summary
</commit_message>
<xml_diff>
--- a/slides/day1.pptx
+++ b/slides/day1.pptx
@@ -6,24 +6,25 @@
   </p:sldMasterIdLst>
   <p:sldIdLst>
     <p:sldId id="260" r:id="rId2"/>
-    <p:sldId id="256" r:id="rId3"/>
-    <p:sldId id="265" r:id="rId4"/>
-    <p:sldId id="261" r:id="rId5"/>
-    <p:sldId id="266" r:id="rId6"/>
-    <p:sldId id="267" r:id="rId7"/>
-    <p:sldId id="262" r:id="rId8"/>
-    <p:sldId id="257" r:id="rId9"/>
-    <p:sldId id="263" r:id="rId10"/>
-    <p:sldId id="269" r:id="rId11"/>
-    <p:sldId id="276" r:id="rId12"/>
-    <p:sldId id="277" r:id="rId13"/>
-    <p:sldId id="268" r:id="rId14"/>
-    <p:sldId id="270" r:id="rId15"/>
-    <p:sldId id="273" r:id="rId16"/>
-    <p:sldId id="272" r:id="rId17"/>
-    <p:sldId id="274" r:id="rId18"/>
-    <p:sldId id="275" r:id="rId19"/>
-    <p:sldId id="271" r:id="rId20"/>
+    <p:sldId id="278" r:id="rId3"/>
+    <p:sldId id="256" r:id="rId4"/>
+    <p:sldId id="265" r:id="rId5"/>
+    <p:sldId id="261" r:id="rId6"/>
+    <p:sldId id="266" r:id="rId7"/>
+    <p:sldId id="267" r:id="rId8"/>
+    <p:sldId id="262" r:id="rId9"/>
+    <p:sldId id="257" r:id="rId10"/>
+    <p:sldId id="263" r:id="rId11"/>
+    <p:sldId id="269" r:id="rId12"/>
+    <p:sldId id="276" r:id="rId13"/>
+    <p:sldId id="277" r:id="rId14"/>
+    <p:sldId id="268" r:id="rId15"/>
+    <p:sldId id="270" r:id="rId16"/>
+    <p:sldId id="273" r:id="rId17"/>
+    <p:sldId id="272" r:id="rId18"/>
+    <p:sldId id="274" r:id="rId19"/>
+    <p:sldId id="275" r:id="rId20"/>
+    <p:sldId id="271" r:id="rId21"/>
   </p:sldIdLst>
   <p:sldSz cx="12192000" cy="6858000"/>
   <p:notesSz cx="6858000" cy="9144000"/>
@@ -621,7 +622,7 @@
           <a:p>
             <a:fld id="{9D8A2B0D-E315-41D0-B099-3ED602A8C128}" type="datetimeFigureOut">
               <a:rPr lang="en-US" smtClean="0"/>
-              <a:t>7/13/2023</a:t>
+              <a:t>7/14/2023</a:t>
             </a:fld>
             <a:endParaRPr lang="en-US"/>
           </a:p>
@@ -1968,7 +1969,7 @@
           <a:p>
             <a:fld id="{9D8A2B0D-E315-41D0-B099-3ED602A8C128}" type="datetimeFigureOut">
               <a:rPr lang="en-US" smtClean="0"/>
-              <a:t>7/13/2023</a:t>
+              <a:t>7/14/2023</a:t>
             </a:fld>
             <a:endParaRPr lang="en-US"/>
           </a:p>
@@ -2732,7 +2733,7 @@
           <p:cNvPr id="2" name="Title 1">
             <a:extLst>
               <a:ext uri="{FF2B5EF4-FFF2-40B4-BE49-F238E27FC236}">
-                <a16:creationId xmlns:a16="http://schemas.microsoft.com/office/drawing/2014/main" id="{784AF4FD-9B40-8F57-8B1C-8613E735F6CD}"/>
+                <a16:creationId xmlns:a16="http://schemas.microsoft.com/office/drawing/2014/main" id="{65D993DC-B965-B84A-46D3-7A0CE61DAA8C}"/>
               </a:ext>
             </a:extLst>
           </p:cNvPr>
@@ -2745,8 +2746,8 @@
         </p:nvSpPr>
         <p:spPr>
           <a:xfrm>
-            <a:off x="838200" y="294236"/>
-            <a:ext cx="10515600" cy="912158"/>
+            <a:off x="838200" y="345957"/>
+            <a:ext cx="10515600" cy="722124"/>
           </a:xfrm>
         </p:spPr>
         <p:txBody>
@@ -2755,7 +2756,7 @@
           <a:p>
             <a:r>
               <a:rPr lang="en-US"/>
-              <a:t>NSF/ATE Grant</a:t>
+              <a:t>Data Science Track</a:t>
             </a:r>
           </a:p>
         </p:txBody>
@@ -2765,7 +2766,7 @@
           <p:cNvPr id="3" name="Content Placeholder 2">
             <a:extLst>
               <a:ext uri="{FF2B5EF4-FFF2-40B4-BE49-F238E27FC236}">
-                <a16:creationId xmlns:a16="http://schemas.microsoft.com/office/drawing/2014/main" id="{9304A670-D6BD-7BCE-B551-18FF7A784D4D}"/>
+                <a16:creationId xmlns:a16="http://schemas.microsoft.com/office/drawing/2014/main" id="{B582D357-94B9-4B44-CB5A-5404D6CE72ED}"/>
               </a:ext>
             </a:extLst>
           </p:cNvPr>
@@ -2778,77 +2779,161 @@
         </p:nvSpPr>
         <p:spPr>
           <a:xfrm>
-            <a:off x="838200" y="1360075"/>
-            <a:ext cx="10515600" cy="4489188"/>
-          </a:xfrm>
-        </p:spPr>
-        <p:txBody>
-          <a:bodyPr/>
+            <a:off x="838200" y="1160289"/>
+            <a:ext cx="11104708" cy="4688973"/>
+          </a:xfrm>
+        </p:spPr>
+        <p:txBody>
+          <a:bodyPr>
+            <a:normAutofit/>
+          </a:bodyPr>
           <a:lstStyle/>
           <a:p>
             <a:r>
               <a:rPr lang="en-US"/>
-              <a:t>DataTEC (</a:t>
-            </a:r>
-            <a:r>
-              <a:rPr lang="en-US" u="sng"/>
-              <a:t>Data</a:t>
-            </a:r>
-            <a:r>
-              <a:rPr lang="en-US"/>
-              <a:t> Science </a:t>
-            </a:r>
-            <a:r>
-              <a:rPr lang="en-US" u="sng"/>
-              <a:t>T</a:t>
-            </a:r>
-            <a:r>
-              <a:rPr lang="en-US"/>
-              <a:t>echnician </a:t>
-            </a:r>
-            <a:r>
-              <a:rPr lang="en-US" u="sng"/>
-              <a:t>E</a:t>
-            </a:r>
-            <a:r>
-              <a:rPr lang="en-US"/>
-              <a:t>ducation &amp; </a:t>
-            </a:r>
-            <a:r>
-              <a:rPr lang="en-US" u="sng"/>
-              <a:t>C</a:t>
-            </a:r>
-            <a:r>
-              <a:rPr lang="en-US"/>
-              <a:t>areers)</a:t>
-            </a:r>
-            <a:br>
-              <a:rPr lang="en-US"/>
-            </a:br>
-            <a:br>
-              <a:rPr lang="en-US"/>
-            </a:br>
-            <a:r>
-              <a:rPr lang="en-US"/>
-              <a:t>"Meeting Industry Needs Through a Two-Year Data Science Technician Education Program"</a:t>
-            </a:r>
-            <a:br>
-              <a:rPr lang="en-US"/>
-            </a:br>
-            <a:br>
-              <a:rPr lang="en-US"/>
-            </a:br>
-            <a:r>
-              <a:rPr lang="en-US"/>
-              <a:t>NSF grant #1902524</a:t>
-            </a:r>
+              <a:t>Added to the CIT program in 2018</a:t>
+            </a:r>
+          </a:p>
+          <a:p>
+            <a:r>
+              <a:rPr lang="en-US"/>
+              <a:t>9 Credit Hours, 3 Courses Minimum (prerequisites not listed)</a:t>
+            </a:r>
+            <a:endParaRPr lang="en-US" sz="2000"/>
+          </a:p>
+          <a:p>
+            <a:pPr lvl="1"/>
+            <a:r>
+              <a:rPr lang="en-US" b="1">
+                <a:solidFill>
+                  <a:srgbClr val="002060"/>
+                </a:solidFill>
+              </a:rPr>
+              <a:t>CIS 2349C - Introduction to Big Data Using Hadoop </a:t>
+            </a:r>
+            <a:r>
+              <a:rPr lang="en-US" b="1">
+                <a:solidFill>
+                  <a:schemeClr val="accent2">
+                    <a:lumMod val="75000"/>
+                  </a:schemeClr>
+                </a:solidFill>
+              </a:rPr>
+              <a:t>(New)</a:t>
+            </a:r>
+          </a:p>
+          <a:p>
+            <a:pPr lvl="1"/>
+            <a:r>
+              <a:rPr lang="en-US" b="1">
+                <a:solidFill>
+                  <a:srgbClr val="002060"/>
+                </a:solidFill>
+              </a:rPr>
+              <a:t>COP 2034C - Programming in Python</a:t>
+            </a:r>
+          </a:p>
+          <a:p>
+            <a:pPr lvl="1"/>
+            <a:r>
+              <a:rPr lang="en-US" b="1">
+                <a:solidFill>
+                  <a:srgbClr val="002060"/>
+                </a:solidFill>
+              </a:rPr>
+              <a:t>COP 2551C - Introduction to Object-Oriented Programming with Java</a:t>
+            </a:r>
+          </a:p>
+          <a:p>
+            <a:pPr lvl="1"/>
+            <a:r>
+              <a:rPr lang="en-US" b="1">
+                <a:solidFill>
+                  <a:srgbClr val="002060"/>
+                </a:solidFill>
+              </a:rPr>
+              <a:t>COP 2073C - Introduction to Statistical Programming with R </a:t>
+            </a:r>
+            <a:r>
+              <a:rPr lang="en-US" b="1">
+                <a:solidFill>
+                  <a:schemeClr val="accent2">
+                    <a:lumMod val="75000"/>
+                  </a:schemeClr>
+                </a:solidFill>
+              </a:rPr>
+              <a:t>(New)</a:t>
+            </a:r>
+          </a:p>
+          <a:p>
+            <a:pPr lvl="2"/>
+            <a:r>
+              <a:rPr lang="en-US" b="1">
+                <a:solidFill>
+                  <a:srgbClr val="002060"/>
+                </a:solidFill>
+              </a:rPr>
+              <a:t>Note: Students must complete STA 2023 prior to enrollment in this course.</a:t>
+            </a:r>
+          </a:p>
+          <a:p>
+            <a:pPr lvl="1"/>
+            <a:r>
+              <a:rPr lang="en-US" b="1">
+                <a:solidFill>
+                  <a:srgbClr val="002060"/>
+                </a:solidFill>
+              </a:rPr>
+              <a:t>CAP 2787C - Data Warehousing </a:t>
+            </a:r>
+            <a:r>
+              <a:rPr lang="en-US" b="1">
+                <a:solidFill>
+                  <a:schemeClr val="accent2">
+                    <a:lumMod val="75000"/>
+                  </a:schemeClr>
+                </a:solidFill>
+              </a:rPr>
+              <a:t>(derived from 4000-level BI course)</a:t>
+            </a:r>
+          </a:p>
+          <a:p>
+            <a:pPr lvl="1"/>
+            <a:r>
+              <a:rPr lang="en-US" b="1">
+                <a:solidFill>
+                  <a:srgbClr val="002060"/>
+                </a:solidFill>
+              </a:rPr>
+              <a:t>CTS 2456C - Introduction to SAS Programming </a:t>
+            </a:r>
+            <a:r>
+              <a:rPr lang="en-US" b="1">
+                <a:solidFill>
+                  <a:schemeClr val="accent2">
+                    <a:lumMod val="75000"/>
+                  </a:schemeClr>
+                </a:solidFill>
+              </a:rPr>
+              <a:t>(New)</a:t>
+            </a:r>
+          </a:p>
+          <a:p>
+            <a:r>
+              <a:rPr lang="en-US" sz="2800"/>
+              <a:t>In 2021 the track was removed since the A.S. in Data Science Technology program implementation was complete</a:t>
+            </a:r>
+            <a:endParaRPr lang="en-US"/>
+          </a:p>
+          <a:p>
+            <a:endParaRPr lang="en-US"/>
           </a:p>
         </p:txBody>
       </p:sp>
     </p:spTree>
     <p:extLst>
       <p:ext uri="{BB962C8B-B14F-4D97-AF65-F5344CB8AC3E}">
-        <p14:creationId xmlns:p14="http://schemas.microsoft.com/office/powerpoint/2010/main" val="3276428980"/>
+        <p14:creationId xmlns:p14="http://schemas.microsoft.com/office/powerpoint/2010/main" val="3607543803"/>
       </p:ext>
     </p:extLst>
   </p:cSld>
@@ -2880,7 +2965,7 @@
           <p:cNvPr id="2" name="Title 1">
             <a:extLst>
               <a:ext uri="{FF2B5EF4-FFF2-40B4-BE49-F238E27FC236}">
-                <a16:creationId xmlns:a16="http://schemas.microsoft.com/office/drawing/2014/main" id="{D633BA2D-E0C7-BFEA-CB89-E02506423CEC}"/>
+                <a16:creationId xmlns:a16="http://schemas.microsoft.com/office/drawing/2014/main" id="{784AF4FD-9B40-8F57-8B1C-8613E735F6CD}"/>
               </a:ext>
             </a:extLst>
           </p:cNvPr>
@@ -2893,8 +2978,8 @@
         </p:nvSpPr>
         <p:spPr>
           <a:xfrm>
-            <a:off x="838200" y="311733"/>
-            <a:ext cx="10515600" cy="697005"/>
+            <a:off x="838200" y="294236"/>
+            <a:ext cx="10515600" cy="912158"/>
           </a:xfrm>
         </p:spPr>
         <p:txBody>
@@ -2903,44 +2988,100 @@
           <a:p>
             <a:r>
               <a:rPr lang="en-US"/>
-              <a:t>DataTEC Grant Timeline – Years 1 &amp; 2</a:t>
-            </a:r>
-          </a:p>
-        </p:txBody>
-      </p:sp>
-      <p:pic>
-        <p:nvPicPr>
-          <p:cNvPr id="5" name="Content Placeholder 4">
+              <a:t>NSF/ATE Grant</a:t>
+            </a:r>
+          </a:p>
+        </p:txBody>
+      </p:sp>
+      <p:sp>
+        <p:nvSpPr>
+          <p:cNvPr id="3" name="Content Placeholder 2">
             <a:extLst>
               <a:ext uri="{FF2B5EF4-FFF2-40B4-BE49-F238E27FC236}">
-                <a16:creationId xmlns:a16="http://schemas.microsoft.com/office/drawing/2014/main" id="{46F5F834-21F0-04E9-70DB-2AC8968DDBBA}"/>
+                <a16:creationId xmlns:a16="http://schemas.microsoft.com/office/drawing/2014/main" id="{9304A670-D6BD-7BCE-B551-18FF7A784D4D}"/>
               </a:ext>
             </a:extLst>
           </p:cNvPr>
-          <p:cNvPicPr>
-            <a:picLocks noGrp="1" noChangeAspect="1"/>
-          </p:cNvPicPr>
+          <p:cNvSpPr>
+            <a:spLocks noGrp="1"/>
+          </p:cNvSpPr>
           <p:nvPr>
             <p:ph idx="1"/>
           </p:nvPr>
-        </p:nvPicPr>
-        <p:blipFill>
-          <a:blip r:embed="rId2"/>
-          <a:stretch>
-            <a:fillRect/>
-          </a:stretch>
-        </p:blipFill>
-        <p:spPr>
-          <a:xfrm>
-            <a:off x="1045028" y="1189134"/>
-            <a:ext cx="8621486" cy="4586939"/>
-          </a:xfrm>
-        </p:spPr>
-      </p:pic>
+        </p:nvSpPr>
+        <p:spPr>
+          <a:xfrm>
+            <a:off x="838200" y="1360075"/>
+            <a:ext cx="10515600" cy="4489188"/>
+          </a:xfrm>
+        </p:spPr>
+        <p:txBody>
+          <a:bodyPr/>
+          <a:lstStyle/>
+          <a:p>
+            <a:r>
+              <a:rPr lang="en-US"/>
+              <a:t>DataTEC (</a:t>
+            </a:r>
+            <a:r>
+              <a:rPr lang="en-US" u="sng"/>
+              <a:t>Data</a:t>
+            </a:r>
+            <a:r>
+              <a:rPr lang="en-US"/>
+              <a:t> Science </a:t>
+            </a:r>
+            <a:r>
+              <a:rPr lang="en-US" u="sng"/>
+              <a:t>T</a:t>
+            </a:r>
+            <a:r>
+              <a:rPr lang="en-US"/>
+              <a:t>echnician </a:t>
+            </a:r>
+            <a:r>
+              <a:rPr lang="en-US" u="sng"/>
+              <a:t>E</a:t>
+            </a:r>
+            <a:r>
+              <a:rPr lang="en-US"/>
+              <a:t>ducation &amp; </a:t>
+            </a:r>
+            <a:r>
+              <a:rPr lang="en-US" u="sng"/>
+              <a:t>C</a:t>
+            </a:r>
+            <a:r>
+              <a:rPr lang="en-US"/>
+              <a:t>areers)</a:t>
+            </a:r>
+            <a:br>
+              <a:rPr lang="en-US"/>
+            </a:br>
+            <a:br>
+              <a:rPr lang="en-US"/>
+            </a:br>
+            <a:r>
+              <a:rPr lang="en-US"/>
+              <a:t>"Meeting Industry Needs Through a Two-Year Data Science Technician Education Program"</a:t>
+            </a:r>
+            <a:br>
+              <a:rPr lang="en-US"/>
+            </a:br>
+            <a:br>
+              <a:rPr lang="en-US"/>
+            </a:br>
+            <a:r>
+              <a:rPr lang="en-US"/>
+              <a:t>NSF grant #1902524</a:t>
+            </a:r>
+          </a:p>
+        </p:txBody>
+      </p:sp>
     </p:spTree>
     <p:extLst>
       <p:ext uri="{BB962C8B-B14F-4D97-AF65-F5344CB8AC3E}">
-        <p14:creationId xmlns:p14="http://schemas.microsoft.com/office/powerpoint/2010/main" val="889591788"/>
+        <p14:creationId xmlns:p14="http://schemas.microsoft.com/office/powerpoint/2010/main" val="3276428980"/>
       </p:ext>
     </p:extLst>
   </p:cSld>
@@ -2995,24 +3136,26 @@
           <a:p>
             <a:r>
               <a:rPr lang="en-US"/>
-              <a:t>DataTEC Grant Timeline – Year 3 &amp; Ongoing</a:t>
+              <a:t>DataTEC Grant Timeline – Years 1 &amp; 2</a:t>
             </a:r>
           </a:p>
         </p:txBody>
       </p:sp>
       <p:pic>
         <p:nvPicPr>
-          <p:cNvPr id="4" name="Picture 3">
+          <p:cNvPr id="5" name="Content Placeholder 4">
             <a:extLst>
               <a:ext uri="{FF2B5EF4-FFF2-40B4-BE49-F238E27FC236}">
-                <a16:creationId xmlns:a16="http://schemas.microsoft.com/office/drawing/2014/main" id="{9260FE37-7F2B-E18D-E187-F79FF8A7E951}"/>
+                <a16:creationId xmlns:a16="http://schemas.microsoft.com/office/drawing/2014/main" id="{46F5F834-21F0-04E9-70DB-2AC8968DDBBA}"/>
               </a:ext>
             </a:extLst>
           </p:cNvPr>
           <p:cNvPicPr>
-            <a:picLocks noChangeAspect="1"/>
+            <a:picLocks noGrp="1" noChangeAspect="1"/>
           </p:cNvPicPr>
-          <p:nvPr/>
+          <p:nvPr>
+            <p:ph idx="1"/>
+          </p:nvPr>
         </p:nvPicPr>
         <p:blipFill>
           <a:blip r:embed="rId2"/>
@@ -3022,95 +3165,15 @@
         </p:blipFill>
         <p:spPr>
           <a:xfrm>
-            <a:off x="784412" y="1083449"/>
-            <a:ext cx="10324530" cy="3611496"/>
-          </a:xfrm>
-          <a:prstGeom prst="rect">
-            <a:avLst/>
-          </a:prstGeom>
+            <a:off x="1045028" y="1189134"/>
+            <a:ext cx="8621486" cy="4586939"/>
+          </a:xfrm>
         </p:spPr>
       </p:pic>
-      <p:sp>
-        <p:nvSpPr>
-          <p:cNvPr id="8" name="Content Placeholder 2">
-            <a:extLst>
-              <a:ext uri="{FF2B5EF4-FFF2-40B4-BE49-F238E27FC236}">
-                <a16:creationId xmlns:a16="http://schemas.microsoft.com/office/drawing/2014/main" id="{A708A864-FF61-CE77-5DE6-70F7610C7656}"/>
-              </a:ext>
-            </a:extLst>
-          </p:cNvPr>
-          <p:cNvSpPr>
-            <a:spLocks noGrp="1"/>
-          </p:cNvSpPr>
-          <p:nvPr>
-            <p:ph idx="1"/>
-          </p:nvPr>
-        </p:nvSpPr>
-        <p:spPr>
-          <a:xfrm>
-            <a:off x="838200" y="1008738"/>
-            <a:ext cx="10515600" cy="4840525"/>
-          </a:xfrm>
-        </p:spPr>
-        <p:txBody>
-          <a:bodyPr>
-            <a:normAutofit lnSpcReduction="10000"/>
-          </a:bodyPr>
-          <a:lstStyle/>
-          <a:p>
-            <a:endParaRPr lang="en-US"/>
-          </a:p>
-          <a:p>
-            <a:endParaRPr lang="en-US"/>
-          </a:p>
-          <a:p>
-            <a:endParaRPr lang="en-US"/>
-          </a:p>
-          <a:p>
-            <a:endParaRPr lang="en-US"/>
-          </a:p>
-          <a:p>
-            <a:pPr marL="0" indent="0">
-              <a:buNone/>
-            </a:pPr>
-            <a:endParaRPr lang="en-US"/>
-          </a:p>
-          <a:p>
-            <a:pPr marL="0" indent="0">
-              <a:buNone/>
-            </a:pPr>
-            <a:endParaRPr lang="en-US"/>
-          </a:p>
-          <a:p>
-            <a:pPr marL="0" indent="0">
-              <a:buNone/>
-            </a:pPr>
-            <a:endParaRPr lang="en-US"/>
-          </a:p>
-          <a:p>
-            <a:pPr marL="0" indent="0">
-              <a:buNone/>
-            </a:pPr>
-            <a:endParaRPr lang="en-US"/>
-          </a:p>
-          <a:p>
-            <a:r>
-              <a:rPr lang="en-US"/>
-              <a:t>Year 4 Extension Approved Spring 2022</a:t>
-            </a:r>
-          </a:p>
-          <a:p>
-            <a:r>
-              <a:rPr lang="en-US"/>
-              <a:t>Investigating Year 5 NCE</a:t>
-            </a:r>
-          </a:p>
-        </p:txBody>
-      </p:sp>
     </p:spTree>
     <p:extLst>
       <p:ext uri="{BB962C8B-B14F-4D97-AF65-F5344CB8AC3E}">
-        <p14:creationId xmlns:p14="http://schemas.microsoft.com/office/powerpoint/2010/main" val="1676849866"/>
+        <p14:creationId xmlns:p14="http://schemas.microsoft.com/office/powerpoint/2010/main" val="889591788"/>
       </p:ext>
     </p:extLst>
   </p:cSld>
@@ -3142,7 +3205,7 @@
           <p:cNvPr id="2" name="Title 1">
             <a:extLst>
               <a:ext uri="{FF2B5EF4-FFF2-40B4-BE49-F238E27FC236}">
-                <a16:creationId xmlns:a16="http://schemas.microsoft.com/office/drawing/2014/main" id="{784AF4FD-9B40-8F57-8B1C-8613E735F6CD}"/>
+                <a16:creationId xmlns:a16="http://schemas.microsoft.com/office/drawing/2014/main" id="{D633BA2D-E0C7-BFEA-CB89-E02506423CEC}"/>
               </a:ext>
             </a:extLst>
           </p:cNvPr>
@@ -3155,29 +3218,57 @@
         </p:nvSpPr>
         <p:spPr>
           <a:xfrm>
-            <a:off x="838200" y="294236"/>
-            <a:ext cx="10515600" cy="912158"/>
-          </a:xfrm>
-        </p:spPr>
-        <p:txBody>
-          <a:bodyPr>
-            <a:normAutofit/>
-          </a:bodyPr>
+            <a:off x="838200" y="311733"/>
+            <a:ext cx="10515600" cy="697005"/>
+          </a:xfrm>
+        </p:spPr>
+        <p:txBody>
+          <a:bodyPr/>
           <a:lstStyle/>
           <a:p>
             <a:r>
               <a:rPr lang="en-US"/>
-              <a:t>A.S. Data Science Technology Curriculum</a:t>
-            </a:r>
-          </a:p>
-        </p:txBody>
-      </p:sp>
-      <p:sp>
-        <p:nvSpPr>
-          <p:cNvPr id="3" name="Content Placeholder 2">
+              <a:t>DataTEC Grant Timeline – Year 3 &amp; Ongoing</a:t>
+            </a:r>
+          </a:p>
+        </p:txBody>
+      </p:sp>
+      <p:pic>
+        <p:nvPicPr>
+          <p:cNvPr id="4" name="Picture 3">
             <a:extLst>
               <a:ext uri="{FF2B5EF4-FFF2-40B4-BE49-F238E27FC236}">
-                <a16:creationId xmlns:a16="http://schemas.microsoft.com/office/drawing/2014/main" id="{9304A670-D6BD-7BCE-B551-18FF7A784D4D}"/>
+                <a16:creationId xmlns:a16="http://schemas.microsoft.com/office/drawing/2014/main" id="{9260FE37-7F2B-E18D-E187-F79FF8A7E951}"/>
+              </a:ext>
+            </a:extLst>
+          </p:cNvPr>
+          <p:cNvPicPr>
+            <a:picLocks noChangeAspect="1"/>
+          </p:cNvPicPr>
+          <p:nvPr/>
+        </p:nvPicPr>
+        <p:blipFill>
+          <a:blip r:embed="rId2"/>
+          <a:stretch>
+            <a:fillRect/>
+          </a:stretch>
+        </p:blipFill>
+        <p:spPr>
+          <a:xfrm>
+            <a:off x="784412" y="1083449"/>
+            <a:ext cx="10324530" cy="3611496"/>
+          </a:xfrm>
+          <a:prstGeom prst="rect">
+            <a:avLst/>
+          </a:prstGeom>
+        </p:spPr>
+      </p:pic>
+      <p:sp>
+        <p:nvSpPr>
+          <p:cNvPr id="8" name="Content Placeholder 2">
+            <a:extLst>
+              <a:ext uri="{FF2B5EF4-FFF2-40B4-BE49-F238E27FC236}">
+                <a16:creationId xmlns:a16="http://schemas.microsoft.com/office/drawing/2014/main" id="{A708A864-FF61-CE77-5DE6-70F7610C7656}"/>
               </a:ext>
             </a:extLst>
           </p:cNvPr>
@@ -3190,103 +3281,61 @@
         </p:nvSpPr>
         <p:spPr>
           <a:xfrm>
-            <a:off x="838200" y="1360075"/>
-            <a:ext cx="10515600" cy="4489188"/>
+            <a:off x="838200" y="1008738"/>
+            <a:ext cx="10515600" cy="4840525"/>
           </a:xfrm>
         </p:spPr>
         <p:txBody>
           <a:bodyPr>
-            <a:normAutofit fontScale="55000" lnSpcReduction="20000"/>
+            <a:normAutofit lnSpcReduction="10000"/>
           </a:bodyPr>
           <a:lstStyle/>
           <a:p>
-            <a:r>
-              <a:rPr lang="en-US"/>
-              <a:t>CAP 2741C - Data Visualization</a:t>
-            </a:r>
-          </a:p>
-          <a:p>
-            <a:r>
-              <a:rPr lang="en-US"/>
-              <a:t>CAP 2787C - Data Warehousing</a:t>
-            </a:r>
-          </a:p>
-          <a:p>
-            <a:r>
-              <a:rPr lang="en-US"/>
-              <a:t>CGS 1060C - Introduction to Information Technology</a:t>
-            </a:r>
-          </a:p>
-          <a:p>
-            <a:r>
-              <a:rPr lang="en-US"/>
-              <a:t>CGS 2512C - Spreadsheet Concepts and Practices</a:t>
-            </a:r>
-          </a:p>
-          <a:p>
-            <a:r>
-              <a:rPr lang="en-US"/>
-              <a:t>CIS 2349C - Introduction to Big Data Using Hadoop</a:t>
-            </a:r>
-          </a:p>
-          <a:p>
-            <a:r>
-              <a:rPr lang="en-US"/>
-              <a:t>CNT 1015 - Operating Systems Foundations</a:t>
-            </a:r>
-          </a:p>
-          <a:p>
-            <a:r>
-              <a:rPr lang="en-US"/>
-              <a:t>CNT 2001C - Computer Networks and Telecommunications</a:t>
-            </a:r>
-          </a:p>
-          <a:p>
-            <a:r>
-              <a:rPr lang="en-US"/>
-              <a:t>COP 1000C - Introduction to Computer Programming</a:t>
-            </a:r>
-          </a:p>
-          <a:p>
-            <a:r>
-              <a:rPr lang="en-US"/>
-              <a:t>COP 2034C - Programming in Python</a:t>
-            </a:r>
-          </a:p>
-          <a:p>
-            <a:r>
-              <a:rPr lang="en-US"/>
-              <a:t>COP 2073C - Introduction to Statistical Programming with R</a:t>
-            </a:r>
-          </a:p>
-          <a:p>
-            <a:r>
-              <a:rPr lang="en-US"/>
-              <a:t>COP 2800C - Java 1</a:t>
-            </a:r>
-          </a:p>
-          <a:p>
-            <a:r>
-              <a:rPr lang="en-US"/>
-              <a:t>COP 2822C - Web Technologies</a:t>
-            </a:r>
-          </a:p>
-          <a:p>
-            <a:r>
-              <a:rPr lang="en-US"/>
-              <a:t>CTS 1120C - Fundamentals of Information Security</a:t>
-            </a:r>
-          </a:p>
-          <a:p>
-            <a:r>
-              <a:rPr lang="en-US"/>
-              <a:t>CTS 2437C - SQL Server I - Fundamentals</a:t>
-            </a:r>
-          </a:p>
-          <a:p>
-            <a:r>
-              <a:rPr lang="en-US"/>
-              <a:t>CTS 2456C - Introduction to SAS Programming</a:t>
+            <a:endParaRPr lang="en-US"/>
+          </a:p>
+          <a:p>
+            <a:endParaRPr lang="en-US"/>
+          </a:p>
+          <a:p>
+            <a:endParaRPr lang="en-US"/>
+          </a:p>
+          <a:p>
+            <a:endParaRPr lang="en-US"/>
+          </a:p>
+          <a:p>
+            <a:pPr marL="0" indent="0">
+              <a:buNone/>
+            </a:pPr>
+            <a:endParaRPr lang="en-US"/>
+          </a:p>
+          <a:p>
+            <a:pPr marL="0" indent="0">
+              <a:buNone/>
+            </a:pPr>
+            <a:endParaRPr lang="en-US"/>
+          </a:p>
+          <a:p>
+            <a:pPr marL="0" indent="0">
+              <a:buNone/>
+            </a:pPr>
+            <a:endParaRPr lang="en-US"/>
+          </a:p>
+          <a:p>
+            <a:pPr marL="0" indent="0">
+              <a:buNone/>
+            </a:pPr>
+            <a:endParaRPr lang="en-US"/>
+          </a:p>
+          <a:p>
+            <a:r>
+              <a:rPr lang="en-US"/>
+              <a:t>Year 4 Extension Approved Spring 2022</a:t>
+            </a:r>
+          </a:p>
+          <a:p>
+            <a:r>
+              <a:rPr lang="en-US"/>
+              <a:t>Investigating Year 5 NCE</a:t>
             </a:r>
           </a:p>
         </p:txBody>
@@ -3294,7 +3343,7 @@
     </p:spTree>
     <p:extLst>
       <p:ext uri="{BB962C8B-B14F-4D97-AF65-F5344CB8AC3E}">
-        <p14:creationId xmlns:p14="http://schemas.microsoft.com/office/powerpoint/2010/main" val="3183742299"/>
+        <p14:creationId xmlns:p14="http://schemas.microsoft.com/office/powerpoint/2010/main" val="1676849866"/>
       </p:ext>
     </p:extLst>
   </p:cSld>
@@ -3339,6 +3388,190 @@
         </p:nvSpPr>
         <p:spPr>
           <a:xfrm>
+            <a:off x="838200" y="294236"/>
+            <a:ext cx="10515600" cy="912158"/>
+          </a:xfrm>
+        </p:spPr>
+        <p:txBody>
+          <a:bodyPr>
+            <a:normAutofit/>
+          </a:bodyPr>
+          <a:lstStyle/>
+          <a:p>
+            <a:r>
+              <a:rPr lang="en-US"/>
+              <a:t>A.S. Data Science Technology Curriculum</a:t>
+            </a:r>
+          </a:p>
+        </p:txBody>
+      </p:sp>
+      <p:sp>
+        <p:nvSpPr>
+          <p:cNvPr id="3" name="Content Placeholder 2">
+            <a:extLst>
+              <a:ext uri="{FF2B5EF4-FFF2-40B4-BE49-F238E27FC236}">
+                <a16:creationId xmlns:a16="http://schemas.microsoft.com/office/drawing/2014/main" id="{9304A670-D6BD-7BCE-B551-18FF7A784D4D}"/>
+              </a:ext>
+            </a:extLst>
+          </p:cNvPr>
+          <p:cNvSpPr>
+            <a:spLocks noGrp="1"/>
+          </p:cNvSpPr>
+          <p:nvPr>
+            <p:ph idx="1"/>
+          </p:nvPr>
+        </p:nvSpPr>
+        <p:spPr>
+          <a:xfrm>
+            <a:off x="838200" y="1360075"/>
+            <a:ext cx="10515600" cy="4489188"/>
+          </a:xfrm>
+        </p:spPr>
+        <p:txBody>
+          <a:bodyPr>
+            <a:normAutofit fontScale="55000" lnSpcReduction="20000"/>
+          </a:bodyPr>
+          <a:lstStyle/>
+          <a:p>
+            <a:r>
+              <a:rPr lang="en-US"/>
+              <a:t>CAP 2741C - Data Visualization</a:t>
+            </a:r>
+          </a:p>
+          <a:p>
+            <a:r>
+              <a:rPr lang="en-US"/>
+              <a:t>CAP 2787C - Data Warehousing</a:t>
+            </a:r>
+          </a:p>
+          <a:p>
+            <a:r>
+              <a:rPr lang="en-US"/>
+              <a:t>CGS 1060C - Introduction to Information Technology</a:t>
+            </a:r>
+          </a:p>
+          <a:p>
+            <a:r>
+              <a:rPr lang="en-US"/>
+              <a:t>CGS 2512C - Spreadsheet Concepts and Practices</a:t>
+            </a:r>
+          </a:p>
+          <a:p>
+            <a:r>
+              <a:rPr lang="en-US"/>
+              <a:t>CIS 2349C - Introduction to Big Data Using Hadoop</a:t>
+            </a:r>
+          </a:p>
+          <a:p>
+            <a:r>
+              <a:rPr lang="en-US"/>
+              <a:t>CNT 1015 - Operating Systems Foundations</a:t>
+            </a:r>
+          </a:p>
+          <a:p>
+            <a:r>
+              <a:rPr lang="en-US"/>
+              <a:t>CNT 2001C - Computer Networks and Telecommunications</a:t>
+            </a:r>
+          </a:p>
+          <a:p>
+            <a:r>
+              <a:rPr lang="en-US"/>
+              <a:t>COP 1000C - Introduction to Computer Programming</a:t>
+            </a:r>
+          </a:p>
+          <a:p>
+            <a:r>
+              <a:rPr lang="en-US"/>
+              <a:t>COP 2034C - Programming in Python</a:t>
+            </a:r>
+          </a:p>
+          <a:p>
+            <a:r>
+              <a:rPr lang="en-US"/>
+              <a:t>COP 2073C - Introduction to Statistical Programming with R</a:t>
+            </a:r>
+          </a:p>
+          <a:p>
+            <a:r>
+              <a:rPr lang="en-US"/>
+              <a:t>COP 2800C - Java 1</a:t>
+            </a:r>
+          </a:p>
+          <a:p>
+            <a:r>
+              <a:rPr lang="en-US"/>
+              <a:t>COP 2822C - Web Technologies</a:t>
+            </a:r>
+          </a:p>
+          <a:p>
+            <a:r>
+              <a:rPr lang="en-US"/>
+              <a:t>CTS 1120C - Fundamentals of Information Security</a:t>
+            </a:r>
+          </a:p>
+          <a:p>
+            <a:r>
+              <a:rPr lang="en-US"/>
+              <a:t>CTS 2437C - SQL Server I - Fundamentals</a:t>
+            </a:r>
+          </a:p>
+          <a:p>
+            <a:r>
+              <a:rPr lang="en-US"/>
+              <a:t>CTS 2456C - Introduction to SAS Programming</a:t>
+            </a:r>
+          </a:p>
+        </p:txBody>
+      </p:sp>
+    </p:spTree>
+    <p:extLst>
+      <p:ext uri="{BB962C8B-B14F-4D97-AF65-F5344CB8AC3E}">
+        <p14:creationId xmlns:p14="http://schemas.microsoft.com/office/powerpoint/2010/main" val="3183742299"/>
+      </p:ext>
+    </p:extLst>
+  </p:cSld>
+  <p:clrMapOvr>
+    <a:masterClrMapping/>
+  </p:clrMapOvr>
+</p:sld>
+</file>
+
+<file path=ppt/slides/slide15.xml><?xml version="1.0" encoding="utf-8"?>
+<p:sld xmlns:a="http://schemas.openxmlformats.org/drawingml/2006/main" xmlns:r="http://schemas.openxmlformats.org/officeDocument/2006/relationships" xmlns:p="http://schemas.openxmlformats.org/presentationml/2006/main">
+  <p:cSld>
+    <p:spTree>
+      <p:nvGrpSpPr>
+        <p:cNvPr id="1" name=""/>
+        <p:cNvGrpSpPr/>
+        <p:nvPr/>
+      </p:nvGrpSpPr>
+      <p:grpSpPr>
+        <a:xfrm>
+          <a:off x="0" y="0"/>
+          <a:ext cx="0" cy="0"/>
+          <a:chOff x="0" y="0"/>
+          <a:chExt cx="0" cy="0"/>
+        </a:xfrm>
+      </p:grpSpPr>
+      <p:sp>
+        <p:nvSpPr>
+          <p:cNvPr id="2" name="Title 1">
+            <a:extLst>
+              <a:ext uri="{FF2B5EF4-FFF2-40B4-BE49-F238E27FC236}">
+                <a16:creationId xmlns:a16="http://schemas.microsoft.com/office/drawing/2014/main" id="{784AF4FD-9B40-8F57-8B1C-8613E735F6CD}"/>
+              </a:ext>
+            </a:extLst>
+          </p:cNvPr>
+          <p:cNvSpPr>
+            <a:spLocks noGrp="1"/>
+          </p:cNvSpPr>
+          <p:nvPr>
+            <p:ph type="title"/>
+          </p:nvPr>
+        </p:nvSpPr>
+        <p:spPr>
+          <a:xfrm>
             <a:off x="838200" y="202028"/>
             <a:ext cx="10515600" cy="612480"/>
           </a:xfrm>
@@ -3401,7 +3634,7 @@
 </p:sld>
 </file>
 
-<file path=ppt/slides/slide15.xml><?xml version="1.0" encoding="utf-8"?>
+<file path=ppt/slides/slide16.xml><?xml version="1.0" encoding="utf-8"?>
 <p:sld xmlns:a="http://schemas.openxmlformats.org/drawingml/2006/main" xmlns:r="http://schemas.openxmlformats.org/officeDocument/2006/relationships" xmlns:p="http://schemas.openxmlformats.org/presentationml/2006/main">
   <p:cSld>
     <p:spTree>
@@ -4079,101 +4312,6 @@
 </p:sld>
 </file>
 
-<file path=ppt/slides/slide16.xml><?xml version="1.0" encoding="utf-8"?>
-<p:sld xmlns:a="http://schemas.openxmlformats.org/drawingml/2006/main" xmlns:r="http://schemas.openxmlformats.org/officeDocument/2006/relationships" xmlns:p="http://schemas.openxmlformats.org/presentationml/2006/main">
-  <p:cSld>
-    <p:spTree>
-      <p:nvGrpSpPr>
-        <p:cNvPr id="1" name=""/>
-        <p:cNvGrpSpPr/>
-        <p:nvPr/>
-      </p:nvGrpSpPr>
-      <p:grpSpPr>
-        <a:xfrm>
-          <a:off x="0" y="0"/>
-          <a:ext cx="0" cy="0"/>
-          <a:chOff x="0" y="0"/>
-          <a:chExt cx="0" cy="0"/>
-        </a:xfrm>
-      </p:grpSpPr>
-      <p:sp>
-        <p:nvSpPr>
-          <p:cNvPr id="2" name="Title 1">
-            <a:extLst>
-              <a:ext uri="{FF2B5EF4-FFF2-40B4-BE49-F238E27FC236}">
-                <a16:creationId xmlns:a16="http://schemas.microsoft.com/office/drawing/2014/main" id="{D11D1E41-7CE4-5B4F-883D-9C592BD2B938}"/>
-              </a:ext>
-            </a:extLst>
-          </p:cNvPr>
-          <p:cNvSpPr>
-            <a:spLocks noGrp="1"/>
-          </p:cNvSpPr>
-          <p:nvPr>
-            <p:ph type="title"/>
-          </p:nvPr>
-        </p:nvSpPr>
-        <p:spPr>
-          <a:xfrm>
-            <a:off x="838200" y="311057"/>
-            <a:ext cx="10515600" cy="697005"/>
-          </a:xfrm>
-        </p:spPr>
-        <p:txBody>
-          <a:bodyPr/>
-          <a:lstStyle/>
-          <a:p>
-            <a:r>
-              <a:rPr lang="en-US"/>
-              <a:t>Free Textbooks for Most Courses</a:t>
-            </a:r>
-          </a:p>
-        </p:txBody>
-      </p:sp>
-      <p:pic>
-        <p:nvPicPr>
-          <p:cNvPr id="4" name="Content Placeholder 3">
-            <a:extLst>
-              <a:ext uri="{FF2B5EF4-FFF2-40B4-BE49-F238E27FC236}">
-                <a16:creationId xmlns:a16="http://schemas.microsoft.com/office/drawing/2014/main" id="{BA511910-EEAD-5AF2-4CE7-837AAD97774A}"/>
-              </a:ext>
-            </a:extLst>
-          </p:cNvPr>
-          <p:cNvPicPr>
-            <a:picLocks noGrp="1" noChangeAspect="1"/>
-          </p:cNvPicPr>
-          <p:nvPr>
-            <p:ph idx="1"/>
-          </p:nvPr>
-        </p:nvPicPr>
-        <p:blipFill>
-          <a:blip r:embed="rId2"/>
-          <a:stretch>
-            <a:fillRect/>
-          </a:stretch>
-        </p:blipFill>
-        <p:spPr>
-          <a:xfrm>
-            <a:off x="1008769" y="1133982"/>
-            <a:ext cx="7336092" cy="4768138"/>
-          </a:xfrm>
-          <a:prstGeom prst="rect">
-            <a:avLst/>
-          </a:prstGeom>
-        </p:spPr>
-      </p:pic>
-    </p:spTree>
-    <p:extLst>
-      <p:ext uri="{BB962C8B-B14F-4D97-AF65-F5344CB8AC3E}">
-        <p14:creationId xmlns:p14="http://schemas.microsoft.com/office/powerpoint/2010/main" val="3417367513"/>
-      </p:ext>
-    </p:extLst>
-  </p:cSld>
-  <p:clrMapOvr>
-    <a:masterClrMapping/>
-  </p:clrMapOvr>
-</p:sld>
-</file>
-
 <file path=ppt/slides/slide17.xml><?xml version="1.0" encoding="utf-8"?>
 <p:sld xmlns:a="http://schemas.openxmlformats.org/drawingml/2006/main" xmlns:r="http://schemas.openxmlformats.org/officeDocument/2006/relationships" xmlns:p="http://schemas.openxmlformats.org/presentationml/2006/main">
   <p:cSld>
@@ -4196,7 +4334,7 @@
           <p:cNvPr id="2" name="Title 1">
             <a:extLst>
               <a:ext uri="{FF2B5EF4-FFF2-40B4-BE49-F238E27FC236}">
-                <a16:creationId xmlns:a16="http://schemas.microsoft.com/office/drawing/2014/main" id="{896777C1-A1DE-C74B-E73D-221D6F40E8C9}"/>
+                <a16:creationId xmlns:a16="http://schemas.microsoft.com/office/drawing/2014/main" id="{D11D1E41-7CE4-5B4F-883D-9C592BD2B938}"/>
               </a:ext>
             </a:extLst>
           </p:cNvPr>
@@ -4209,8 +4347,8 @@
         </p:nvSpPr>
         <p:spPr>
           <a:xfrm>
-            <a:off x="592311" y="401812"/>
-            <a:ext cx="10515600" cy="727741"/>
+            <a:off x="838200" y="311057"/>
+            <a:ext cx="10515600" cy="697005"/>
           </a:xfrm>
         </p:spPr>
         <p:txBody>
@@ -4219,108 +4357,47 @@
           <a:p>
             <a:r>
               <a:rPr lang="en-US"/>
-              <a:t>Industry Certification Exam Preparation</a:t>
-            </a:r>
-          </a:p>
-        </p:txBody>
-      </p:sp>
-      <p:sp>
-        <p:nvSpPr>
-          <p:cNvPr id="3" name="Content Placeholder 2">
+              <a:t>Free Textbooks for Most Courses</a:t>
+            </a:r>
+          </a:p>
+        </p:txBody>
+      </p:sp>
+      <p:pic>
+        <p:nvPicPr>
+          <p:cNvPr id="4" name="Content Placeholder 3">
             <a:extLst>
               <a:ext uri="{FF2B5EF4-FFF2-40B4-BE49-F238E27FC236}">
-                <a16:creationId xmlns:a16="http://schemas.microsoft.com/office/drawing/2014/main" id="{19246D22-F93C-289C-AA69-7C982AD18F8D}"/>
+                <a16:creationId xmlns:a16="http://schemas.microsoft.com/office/drawing/2014/main" id="{BA511910-EEAD-5AF2-4CE7-837AAD97774A}"/>
               </a:ext>
             </a:extLst>
           </p:cNvPr>
-          <p:cNvSpPr>
-            <a:spLocks noGrp="1"/>
-          </p:cNvSpPr>
+          <p:cNvPicPr>
+            <a:picLocks noGrp="1" noChangeAspect="1"/>
+          </p:cNvPicPr>
           <p:nvPr>
             <p:ph idx="1"/>
           </p:nvPr>
-        </p:nvSpPr>
-        <p:spPr>
-          <a:xfrm>
-            <a:off x="592311" y="1379080"/>
-            <a:ext cx="10972160" cy="4399313"/>
-          </a:xfrm>
-        </p:spPr>
-        <p:txBody>
-          <a:bodyPr>
-            <a:normAutofit/>
-          </a:bodyPr>
-          <a:lstStyle/>
-          <a:p>
-            <a:r>
-              <a:rPr lang="en-US"/>
-              <a:t>Students will be prepared through their coursework to take exams which provide the following certifications:</a:t>
-            </a:r>
-          </a:p>
-          <a:p>
-            <a:pPr lvl="1"/>
-            <a:r>
-              <a:rPr lang="en-US"/>
-              <a:t>CompTIA Network+ (CNT2001C)</a:t>
-            </a:r>
-          </a:p>
-          <a:p>
-            <a:pPr lvl="1"/>
-            <a:r>
-              <a:rPr lang="en-US"/>
-              <a:t>CompTIA Security+ (CTS1120C)</a:t>
-            </a:r>
-          </a:p>
-          <a:p>
-            <a:pPr lvl="1"/>
-            <a:r>
-              <a:rPr lang="en-US"/>
-              <a:t>Oracle Java OCA SE8 (COP2800C)</a:t>
-            </a:r>
-          </a:p>
-          <a:p>
-            <a:pPr lvl="1"/>
-            <a:r>
-              <a:rPr lang="en-US"/>
-              <a:t>SAS Base Programming (CTS2450C)</a:t>
-            </a:r>
-          </a:p>
-          <a:p>
-            <a:pPr lvl="1"/>
-            <a:r>
-              <a:rPr lang="en-US"/>
-              <a:t>Certified Associate in Python Programming (PCAP)  (COP2034C)</a:t>
-            </a:r>
-          </a:p>
-          <a:p>
-            <a:pPr lvl="1"/>
-            <a:r>
-              <a:rPr lang="en-US"/>
-              <a:t>Microsoft Office Specialist / Excel (CGS2512)</a:t>
-            </a:r>
-          </a:p>
-          <a:p>
-            <a:pPr lvl="1"/>
-            <a:r>
-              <a:rPr lang="en-US"/>
-              <a:t>Tableau Desktop Specialist (CAP2741C)</a:t>
-            </a:r>
-          </a:p>
-          <a:p>
-            <a:r>
-              <a:rPr lang="en-US"/>
-              <a:t>Exam Voucher Grant Funds Available</a:t>
-            </a:r>
-          </a:p>
-          <a:p>
-            <a:endParaRPr lang="en-US"/>
-          </a:p>
-        </p:txBody>
-      </p:sp>
+        </p:nvPicPr>
+        <p:blipFill>
+          <a:blip r:embed="rId2"/>
+          <a:stretch>
+            <a:fillRect/>
+          </a:stretch>
+        </p:blipFill>
+        <p:spPr>
+          <a:xfrm>
+            <a:off x="1008769" y="1133982"/>
+            <a:ext cx="7336092" cy="4768138"/>
+          </a:xfrm>
+          <a:prstGeom prst="rect">
+            <a:avLst/>
+          </a:prstGeom>
+        </p:spPr>
+      </p:pic>
     </p:spTree>
     <p:extLst>
       <p:ext uri="{BB962C8B-B14F-4D97-AF65-F5344CB8AC3E}">
-        <p14:creationId xmlns:p14="http://schemas.microsoft.com/office/powerpoint/2010/main" val="3058511705"/>
+        <p14:creationId xmlns:p14="http://schemas.microsoft.com/office/powerpoint/2010/main" val="3417367513"/>
       </p:ext>
     </p:extLst>
   </p:cSld>
@@ -4352,6 +4429,162 @@
           <p:cNvPr id="2" name="Title 1">
             <a:extLst>
               <a:ext uri="{FF2B5EF4-FFF2-40B4-BE49-F238E27FC236}">
+                <a16:creationId xmlns:a16="http://schemas.microsoft.com/office/drawing/2014/main" id="{896777C1-A1DE-C74B-E73D-221D6F40E8C9}"/>
+              </a:ext>
+            </a:extLst>
+          </p:cNvPr>
+          <p:cNvSpPr>
+            <a:spLocks noGrp="1"/>
+          </p:cNvSpPr>
+          <p:nvPr>
+            <p:ph type="title"/>
+          </p:nvPr>
+        </p:nvSpPr>
+        <p:spPr>
+          <a:xfrm>
+            <a:off x="592311" y="401812"/>
+            <a:ext cx="10515600" cy="727741"/>
+          </a:xfrm>
+        </p:spPr>
+        <p:txBody>
+          <a:bodyPr/>
+          <a:lstStyle/>
+          <a:p>
+            <a:r>
+              <a:rPr lang="en-US"/>
+              <a:t>Industry Certification Exam Preparation</a:t>
+            </a:r>
+          </a:p>
+        </p:txBody>
+      </p:sp>
+      <p:sp>
+        <p:nvSpPr>
+          <p:cNvPr id="3" name="Content Placeholder 2">
+            <a:extLst>
+              <a:ext uri="{FF2B5EF4-FFF2-40B4-BE49-F238E27FC236}">
+                <a16:creationId xmlns:a16="http://schemas.microsoft.com/office/drawing/2014/main" id="{19246D22-F93C-289C-AA69-7C982AD18F8D}"/>
+              </a:ext>
+            </a:extLst>
+          </p:cNvPr>
+          <p:cNvSpPr>
+            <a:spLocks noGrp="1"/>
+          </p:cNvSpPr>
+          <p:nvPr>
+            <p:ph idx="1"/>
+          </p:nvPr>
+        </p:nvSpPr>
+        <p:spPr>
+          <a:xfrm>
+            <a:off x="592311" y="1379080"/>
+            <a:ext cx="10972160" cy="4399313"/>
+          </a:xfrm>
+        </p:spPr>
+        <p:txBody>
+          <a:bodyPr>
+            <a:normAutofit/>
+          </a:bodyPr>
+          <a:lstStyle/>
+          <a:p>
+            <a:r>
+              <a:rPr lang="en-US"/>
+              <a:t>Students will be prepared through their coursework to take exams which provide the following certifications:</a:t>
+            </a:r>
+          </a:p>
+          <a:p>
+            <a:pPr lvl="1"/>
+            <a:r>
+              <a:rPr lang="en-US"/>
+              <a:t>CompTIA Network+ (CNT2001C)</a:t>
+            </a:r>
+          </a:p>
+          <a:p>
+            <a:pPr lvl="1"/>
+            <a:r>
+              <a:rPr lang="en-US"/>
+              <a:t>CompTIA Security+ (CTS1120C)</a:t>
+            </a:r>
+          </a:p>
+          <a:p>
+            <a:pPr lvl="1"/>
+            <a:r>
+              <a:rPr lang="en-US"/>
+              <a:t>Oracle Java OCA SE8 (COP2800C)</a:t>
+            </a:r>
+          </a:p>
+          <a:p>
+            <a:pPr lvl="1"/>
+            <a:r>
+              <a:rPr lang="en-US"/>
+              <a:t>SAS Base Programming (CTS2450C)</a:t>
+            </a:r>
+          </a:p>
+          <a:p>
+            <a:pPr lvl="1"/>
+            <a:r>
+              <a:rPr lang="en-US"/>
+              <a:t>Certified Associate in Python Programming (PCAP)  (COP2034C)</a:t>
+            </a:r>
+          </a:p>
+          <a:p>
+            <a:pPr lvl="1"/>
+            <a:r>
+              <a:rPr lang="en-US"/>
+              <a:t>Microsoft Office Specialist / Excel (CGS2512)</a:t>
+            </a:r>
+          </a:p>
+          <a:p>
+            <a:pPr lvl="1"/>
+            <a:r>
+              <a:rPr lang="en-US"/>
+              <a:t>Tableau Desktop Specialist (CAP2741C)</a:t>
+            </a:r>
+          </a:p>
+          <a:p>
+            <a:r>
+              <a:rPr lang="en-US"/>
+              <a:t>Exam Voucher Grant Funds Available</a:t>
+            </a:r>
+          </a:p>
+          <a:p>
+            <a:endParaRPr lang="en-US"/>
+          </a:p>
+        </p:txBody>
+      </p:sp>
+    </p:spTree>
+    <p:extLst>
+      <p:ext uri="{BB962C8B-B14F-4D97-AF65-F5344CB8AC3E}">
+        <p14:creationId xmlns:p14="http://schemas.microsoft.com/office/powerpoint/2010/main" val="3058511705"/>
+      </p:ext>
+    </p:extLst>
+  </p:cSld>
+  <p:clrMapOvr>
+    <a:masterClrMapping/>
+  </p:clrMapOvr>
+</p:sld>
+</file>
+
+<file path=ppt/slides/slide19.xml><?xml version="1.0" encoding="utf-8"?>
+<p:sld xmlns:a="http://schemas.openxmlformats.org/drawingml/2006/main" xmlns:r="http://schemas.openxmlformats.org/officeDocument/2006/relationships" xmlns:p="http://schemas.openxmlformats.org/presentationml/2006/main">
+  <p:cSld>
+    <p:spTree>
+      <p:nvGrpSpPr>
+        <p:cNvPr id="1" name=""/>
+        <p:cNvGrpSpPr/>
+        <p:nvPr/>
+      </p:nvGrpSpPr>
+      <p:grpSpPr>
+        <a:xfrm>
+          <a:off x="0" y="0"/>
+          <a:ext cx="0" cy="0"/>
+          <a:chOff x="0" y="0"/>
+          <a:chExt cx="0" cy="0"/>
+        </a:xfrm>
+      </p:grpSpPr>
+      <p:sp>
+        <p:nvSpPr>
+          <p:cNvPr id="2" name="Title 1">
+            <a:extLst>
+              <a:ext uri="{FF2B5EF4-FFF2-40B4-BE49-F238E27FC236}">
                 <a16:creationId xmlns:a16="http://schemas.microsoft.com/office/drawing/2014/main" id="{B2718BAC-912B-5BD7-5C0F-F6E8B1F0937C}"/>
               </a:ext>
             </a:extLst>
@@ -4464,7 +4697,507 @@
 </p:sld>
 </file>
 
-<file path=ppt/slides/slide19.xml><?xml version="1.0" encoding="utf-8"?>
+<file path=ppt/slides/slide2.xml><?xml version="1.0" encoding="utf-8"?>
+<p:sld xmlns:a="http://schemas.openxmlformats.org/drawingml/2006/main" xmlns:r="http://schemas.openxmlformats.org/officeDocument/2006/relationships" xmlns:p="http://schemas.openxmlformats.org/presentationml/2006/main">
+  <p:cSld>
+    <p:spTree>
+      <p:nvGrpSpPr>
+        <p:cNvPr id="1" name=""/>
+        <p:cNvGrpSpPr/>
+        <p:nvPr/>
+      </p:nvGrpSpPr>
+      <p:grpSpPr>
+        <a:xfrm>
+          <a:off x="0" y="0"/>
+          <a:ext cx="0" cy="0"/>
+          <a:chOff x="0" y="0"/>
+          <a:chExt cx="0" cy="0"/>
+        </a:xfrm>
+      </p:grpSpPr>
+      <p:sp>
+        <p:nvSpPr>
+          <p:cNvPr id="3" name="Content Placeholder 2">
+            <a:extLst>
+              <a:ext uri="{FF2B5EF4-FFF2-40B4-BE49-F238E27FC236}">
+                <a16:creationId xmlns:a16="http://schemas.microsoft.com/office/drawing/2014/main" id="{AA343FB2-419C-34A7-58A7-D41ED736B791}"/>
+              </a:ext>
+            </a:extLst>
+          </p:cNvPr>
+          <p:cNvSpPr>
+            <a:spLocks noGrp="1"/>
+          </p:cNvSpPr>
+          <p:nvPr>
+            <p:ph idx="1"/>
+          </p:nvPr>
+        </p:nvSpPr>
+        <p:spPr>
+          <a:xfrm>
+            <a:off x="838200" y="1537855"/>
+            <a:ext cx="10515600" cy="4311407"/>
+          </a:xfrm>
+        </p:spPr>
+        <p:txBody>
+          <a:bodyPr>
+            <a:normAutofit fontScale="85000" lnSpcReduction="20000"/>
+          </a:bodyPr>
+          <a:lstStyle/>
+          <a:p>
+            <a:pPr marL="0" marR="0">
+              <a:spcBef>
+                <a:spcPts val="0"/>
+              </a:spcBef>
+              <a:spcAft>
+                <a:spcPts val="0"/>
+              </a:spcAft>
+            </a:pPr>
+            <a:r>
+              <a:rPr lang="en-US" b="1">
+                <a:latin typeface="Calibri" panose="020F0502020204030204" pitchFamily="34" charset="0"/>
+                <a:ea typeface="Calibri" panose="020F0502020204030204" pitchFamily="34" charset="0"/>
+              </a:rPr>
+              <a:t>Day 1 Monday July 17</a:t>
+            </a:r>
+          </a:p>
+          <a:p>
+            <a:pPr marL="0" marR="0">
+              <a:spcBef>
+                <a:spcPts val="0"/>
+              </a:spcBef>
+              <a:spcAft>
+                <a:spcPts val="0"/>
+              </a:spcAft>
+            </a:pPr>
+            <a:endParaRPr lang="en-US" sz="1800" b="1">
+              <a:effectLst/>
+              <a:latin typeface="Calibri" panose="020F0502020204030204" pitchFamily="34" charset="0"/>
+              <a:ea typeface="Calibri" panose="020F0502020204030204" pitchFamily="34" charset="0"/>
+            </a:endParaRPr>
+          </a:p>
+          <a:p>
+            <a:pPr marL="0" marR="0">
+              <a:spcBef>
+                <a:spcPts val="0"/>
+              </a:spcBef>
+              <a:spcAft>
+                <a:spcPts val="0"/>
+              </a:spcAft>
+            </a:pPr>
+            <a:r>
+              <a:rPr lang="en-US" sz="2600" b="1">
+                <a:latin typeface="Calibri" panose="020F0502020204030204" pitchFamily="34" charset="0"/>
+                <a:ea typeface="Calibri" panose="020F0502020204030204" pitchFamily="34" charset="0"/>
+              </a:rPr>
+              <a:t>Morning</a:t>
+            </a:r>
+          </a:p>
+          <a:p>
+            <a:pPr marL="457200" lvl="1" indent="228600">
+              <a:spcBef>
+                <a:spcPts val="0"/>
+              </a:spcBef>
+            </a:pPr>
+            <a:r>
+              <a:rPr lang="en-US" sz="1900">
+                <a:effectLst/>
+                <a:latin typeface="Calibri" panose="020F0502020204030204" pitchFamily="34" charset="0"/>
+                <a:ea typeface="Calibri" panose="020F0502020204030204" pitchFamily="34" charset="0"/>
+              </a:rPr>
+              <a:t>A.S. in Data Science Technology - History and Update</a:t>
+            </a:r>
+          </a:p>
+          <a:p>
+            <a:pPr marL="457200" lvl="1" indent="228600">
+              <a:spcBef>
+                <a:spcPts val="0"/>
+              </a:spcBef>
+            </a:pPr>
+            <a:r>
+              <a:rPr lang="en-US" sz="1900">
+                <a:effectLst/>
+                <a:latin typeface="Calibri" panose="020F0502020204030204" pitchFamily="34" charset="0"/>
+                <a:ea typeface="Calibri" panose="020F0502020204030204" pitchFamily="34" charset="0"/>
+              </a:rPr>
+              <a:t>Embedded Certifications</a:t>
+            </a:r>
+          </a:p>
+          <a:p>
+            <a:pPr marL="457200" lvl="1" indent="228600">
+              <a:spcBef>
+                <a:spcPts val="0"/>
+              </a:spcBef>
+            </a:pPr>
+            <a:r>
+              <a:rPr lang="en-US" sz="1900">
+                <a:effectLst/>
+                <a:latin typeface="Calibri" panose="020F0502020204030204" pitchFamily="34" charset="0"/>
+                <a:ea typeface="Calibri" panose="020F0502020204030204" pitchFamily="34" charset="0"/>
+              </a:rPr>
+              <a:t>Data Science Technician</a:t>
+            </a:r>
+          </a:p>
+          <a:p>
+            <a:pPr marL="457200" lvl="1" indent="228600">
+              <a:spcBef>
+                <a:spcPts val="0"/>
+              </a:spcBef>
+            </a:pPr>
+            <a:r>
+              <a:rPr lang="en-US" sz="1900">
+                <a:effectLst/>
+                <a:latin typeface="Calibri" panose="020F0502020204030204" pitchFamily="34" charset="0"/>
+                <a:ea typeface="Calibri" panose="020F0502020204030204" pitchFamily="34" charset="0"/>
+              </a:rPr>
+              <a:t>FinTech Technician</a:t>
+            </a:r>
+          </a:p>
+          <a:p>
+            <a:pPr marL="457200" lvl="1" indent="228600">
+              <a:spcBef>
+                <a:spcPts val="0"/>
+              </a:spcBef>
+            </a:pPr>
+            <a:r>
+              <a:rPr lang="en-US" sz="1900">
+                <a:effectLst/>
+                <a:latin typeface="Calibri" panose="020F0502020204030204" pitchFamily="34" charset="0"/>
+                <a:ea typeface="Calibri" panose="020F0502020204030204" pitchFamily="34" charset="0"/>
+              </a:rPr>
+              <a:t>Industry Certifications</a:t>
+            </a:r>
+          </a:p>
+          <a:p>
+            <a:pPr marL="914400" lvl="2" indent="228600">
+              <a:spcBef>
+                <a:spcPts val="0"/>
+              </a:spcBef>
+            </a:pPr>
+            <a:r>
+              <a:rPr lang="en-US" sz="1900">
+                <a:effectLst/>
+                <a:latin typeface="Calibri" panose="020F0502020204030204" pitchFamily="34" charset="0"/>
+                <a:ea typeface="Calibri" panose="020F0502020204030204" pitchFamily="34" charset="0"/>
+              </a:rPr>
+              <a:t>Reimbursement</a:t>
+            </a:r>
+            <a:endParaRPr lang="en-US" sz="1500">
+              <a:effectLst/>
+              <a:latin typeface="Calibri" panose="020F0502020204030204" pitchFamily="34" charset="0"/>
+              <a:ea typeface="Calibri" panose="020F0502020204030204" pitchFamily="34" charset="0"/>
+            </a:endParaRPr>
+          </a:p>
+          <a:p>
+            <a:pPr marL="914400" lvl="2" indent="228600">
+              <a:spcBef>
+                <a:spcPts val="0"/>
+              </a:spcBef>
+            </a:pPr>
+            <a:r>
+              <a:rPr lang="en-US" sz="1900">
+                <a:effectLst/>
+                <a:latin typeface="Calibri" panose="020F0502020204030204" pitchFamily="34" charset="0"/>
+                <a:ea typeface="Calibri" panose="020F0502020204030204" pitchFamily="34" charset="0"/>
+              </a:rPr>
+              <a:t>Implementation in curriculum</a:t>
+            </a:r>
+          </a:p>
+          <a:p>
+            <a:pPr marL="457200" lvl="1" indent="228600">
+              <a:spcBef>
+                <a:spcPts val="0"/>
+              </a:spcBef>
+            </a:pPr>
+            <a:r>
+              <a:rPr lang="en-US" sz="1900">
+                <a:effectLst/>
+                <a:latin typeface="Calibri" panose="020F0502020204030204" pitchFamily="34" charset="0"/>
+                <a:ea typeface="Calibri" panose="020F0502020204030204" pitchFamily="34" charset="0"/>
+              </a:rPr>
+              <a:t>KSA Process</a:t>
+            </a:r>
+          </a:p>
+          <a:p>
+            <a:pPr marL="457200" lvl="1" indent="228600">
+              <a:spcBef>
+                <a:spcPts val="0"/>
+              </a:spcBef>
+            </a:pPr>
+            <a:r>
+              <a:rPr lang="en-US" sz="1900">
+                <a:effectLst/>
+                <a:latin typeface="Calibri" panose="020F0502020204030204" pitchFamily="34" charset="0"/>
+                <a:ea typeface="Calibri" panose="020F0502020204030204" pitchFamily="34" charset="0"/>
+              </a:rPr>
+              <a:t>Learning from Attending Conference Workshops and Sessions</a:t>
+            </a:r>
+          </a:p>
+          <a:p>
+            <a:pPr marL="914400" lvl="2" indent="228600">
+              <a:spcBef>
+                <a:spcPts val="0"/>
+              </a:spcBef>
+            </a:pPr>
+            <a:r>
+              <a:rPr lang="en-US" sz="1900">
+                <a:effectLst/>
+                <a:latin typeface="Calibri" panose="020F0502020204030204" pitchFamily="34" charset="0"/>
+                <a:ea typeface="Calibri" panose="020F0502020204030204" pitchFamily="34" charset="0"/>
+              </a:rPr>
+              <a:t>Making professional connections</a:t>
+            </a:r>
+          </a:p>
+          <a:p>
+            <a:pPr marL="914400" lvl="2" indent="228600">
+              <a:spcBef>
+                <a:spcPts val="0"/>
+              </a:spcBef>
+            </a:pPr>
+            <a:r>
+              <a:rPr lang="en-US" sz="1900">
+                <a:effectLst/>
+                <a:latin typeface="Calibri" panose="020F0502020204030204" pitchFamily="34" charset="0"/>
+                <a:ea typeface="Calibri" panose="020F0502020204030204" pitchFamily="34" charset="0"/>
+              </a:rPr>
+              <a:t>Splunk</a:t>
+            </a:r>
+          </a:p>
+          <a:p>
+            <a:pPr marL="914400" lvl="2" indent="228600">
+              <a:spcBef>
+                <a:spcPts val="0"/>
+              </a:spcBef>
+            </a:pPr>
+            <a:r>
+              <a:rPr lang="en-US" sz="1900">
+                <a:effectLst/>
+                <a:latin typeface="Calibri" panose="020F0502020204030204" pitchFamily="34" charset="0"/>
+                <a:ea typeface="Calibri" panose="020F0502020204030204" pitchFamily="34" charset="0"/>
+              </a:rPr>
+              <a:t>Alteryx</a:t>
+            </a:r>
+          </a:p>
+          <a:p>
+            <a:pPr marL="914400" lvl="3" indent="228600">
+              <a:spcBef>
+                <a:spcPts val="0"/>
+              </a:spcBef>
+            </a:pPr>
+            <a:r>
+              <a:rPr lang="en-US" sz="1900">
+                <a:latin typeface="Calibri" panose="020F0502020204030204" pitchFamily="34" charset="0"/>
+                <a:ea typeface="Calibri" panose="020F0502020204030204" pitchFamily="34" charset="0"/>
+              </a:rPr>
+              <a:t>Machine Learning/AI</a:t>
+            </a:r>
+          </a:p>
+          <a:p>
+            <a:pPr marL="457200" lvl="1" indent="228600">
+              <a:spcBef>
+                <a:spcPts val="0"/>
+              </a:spcBef>
+            </a:pPr>
+            <a:r>
+              <a:rPr lang="en-US" sz="1900">
+                <a:effectLst/>
+                <a:latin typeface="Calibri" panose="020F0502020204030204" pitchFamily="34" charset="0"/>
+                <a:ea typeface="Calibri" panose="020F0502020204030204" pitchFamily="34" charset="0"/>
+              </a:rPr>
+              <a:t>Learning from Disseminating at Conference Workshops and Sessions</a:t>
+            </a:r>
+          </a:p>
+          <a:p>
+            <a:pPr marL="457200" lvl="1" indent="228600">
+              <a:spcBef>
+                <a:spcPts val="0"/>
+              </a:spcBef>
+            </a:pPr>
+            <a:r>
+              <a:rPr lang="en-US" sz="1900">
+                <a:effectLst/>
+                <a:latin typeface="Calibri" panose="020F0502020204030204" pitchFamily="34" charset="0"/>
+                <a:ea typeface="Calibri" panose="020F0502020204030204" pitchFamily="34" charset="0"/>
+              </a:rPr>
+              <a:t>Building a foundation for a B.A.S.</a:t>
+            </a:r>
+          </a:p>
+          <a:p>
+            <a:pPr marL="0">
+              <a:spcBef>
+                <a:spcPts val="0"/>
+              </a:spcBef>
+            </a:pPr>
+            <a:r>
+              <a:rPr lang="en-US" sz="2600" b="1">
+                <a:latin typeface="Calibri" panose="020F0502020204030204" pitchFamily="34" charset="0"/>
+                <a:ea typeface="Calibri" panose="020F0502020204030204" pitchFamily="34" charset="0"/>
+              </a:rPr>
+              <a:t>Afternoon</a:t>
+            </a:r>
+          </a:p>
+          <a:p>
+            <a:pPr marL="457200" lvl="1" indent="228600">
+              <a:spcBef>
+                <a:spcPts val="0"/>
+              </a:spcBef>
+            </a:pPr>
+            <a:r>
+              <a:rPr lang="en-US" sz="1900">
+                <a:effectLst/>
+                <a:latin typeface="Calibri" panose="020F0502020204030204" pitchFamily="34" charset="0"/>
+                <a:ea typeface="Calibri" panose="020F0502020204030204" pitchFamily="34" charset="0"/>
+              </a:rPr>
+              <a:t>Lessons learned (Git, GitHub, and GitHub Classroom)</a:t>
+            </a:r>
+            <a:br>
+              <a:rPr lang="en-US" sz="1900">
+                <a:effectLst/>
+                <a:latin typeface="Calibri" panose="020F0502020204030204" pitchFamily="34" charset="0"/>
+                <a:ea typeface="Calibri" panose="020F0502020204030204" pitchFamily="34" charset="0"/>
+              </a:rPr>
+            </a:br>
+            <a:r>
+              <a:rPr lang="en-US" sz="1900">
+                <a:effectLst/>
+                <a:latin typeface="Calibri" panose="020F0502020204030204" pitchFamily="34" charset="0"/>
+                <a:ea typeface="Calibri" panose="020F0502020204030204" pitchFamily="34" charset="0"/>
+              </a:rPr>
+              <a:t>     </a:t>
+            </a:r>
+            <a:r>
+              <a:rPr lang="en-US" sz="1900" b="1">
+                <a:effectLst/>
+                <a:latin typeface="Calibri" panose="020F0502020204030204" pitchFamily="34" charset="0"/>
+                <a:ea typeface="Calibri" panose="020F0502020204030204" pitchFamily="34" charset="0"/>
+              </a:rPr>
+              <a:t>(Create an account at </a:t>
+            </a:r>
+            <a:r>
+              <a:rPr lang="en-US" sz="1900" b="1" u="sng">
+                <a:solidFill>
+                  <a:srgbClr val="0563C1"/>
+                </a:solidFill>
+                <a:effectLst/>
+                <a:latin typeface="Calibri" panose="020F0502020204030204" pitchFamily="34" charset="0"/>
+                <a:ea typeface="Calibri" panose="020F0502020204030204" pitchFamily="34" charset="0"/>
+                <a:hlinkClick r:id="rId2"/>
+              </a:rPr>
+              <a:t>https://github.com</a:t>
+            </a:r>
+            <a:r>
+              <a:rPr lang="en-US" sz="1900" b="1">
+                <a:effectLst/>
+                <a:latin typeface="Calibri" panose="020F0502020204030204" pitchFamily="34" charset="0"/>
+                <a:ea typeface="Calibri" panose="020F0502020204030204" pitchFamily="34" charset="0"/>
+              </a:rPr>
+              <a:t>  and </a:t>
+            </a:r>
+            <a:r>
+              <a:rPr lang="en-US" sz="1900" b="1" u="sng">
+                <a:solidFill>
+                  <a:srgbClr val="0563C1"/>
+                </a:solidFill>
+                <a:effectLst/>
+                <a:latin typeface="Calibri" panose="020F0502020204030204" pitchFamily="34" charset="0"/>
+                <a:ea typeface="Calibri" panose="020F0502020204030204" pitchFamily="34" charset="0"/>
+                <a:hlinkClick r:id="rId3"/>
+              </a:rPr>
+              <a:t>https://classroom.github.com</a:t>
+            </a:r>
+            <a:r>
+              <a:rPr lang="en-US" sz="1900" b="1">
+                <a:effectLst/>
+                <a:latin typeface="Calibri" panose="020F0502020204030204" pitchFamily="34" charset="0"/>
+                <a:ea typeface="Calibri" panose="020F0502020204030204" pitchFamily="34" charset="0"/>
+              </a:rPr>
+              <a:t> )</a:t>
+            </a:r>
+            <a:endParaRPr lang="en-US" sz="1900">
+              <a:effectLst/>
+              <a:latin typeface="Calibri" panose="020F0502020204030204" pitchFamily="34" charset="0"/>
+              <a:ea typeface="Calibri" panose="020F0502020204030204" pitchFamily="34" charset="0"/>
+            </a:endParaRPr>
+          </a:p>
+          <a:p>
+            <a:pPr marL="457200" lvl="1" indent="228600">
+              <a:spcBef>
+                <a:spcPts val="0"/>
+              </a:spcBef>
+            </a:pPr>
+            <a:r>
+              <a:rPr lang="en-US" sz="1900">
+                <a:effectLst/>
+                <a:latin typeface="Calibri" panose="020F0502020204030204" pitchFamily="34" charset="0"/>
+                <a:ea typeface="Calibri" panose="020F0502020204030204" pitchFamily="34" charset="0"/>
+              </a:rPr>
+              <a:t>Student presentation (William Money)</a:t>
+            </a:r>
+          </a:p>
+          <a:p>
+            <a:pPr marL="457200" lvl="1" indent="228600">
+              <a:spcBef>
+                <a:spcPts val="0"/>
+              </a:spcBef>
+            </a:pPr>
+            <a:r>
+              <a:rPr lang="en-US" sz="1900">
+                <a:effectLst/>
+                <a:latin typeface="Calibri" panose="020F0502020204030204" pitchFamily="34" charset="0"/>
+                <a:ea typeface="Calibri" panose="020F0502020204030204" pitchFamily="34" charset="0"/>
+              </a:rPr>
+              <a:t>Guest Speaker: BILT at FSCJ (Dr. Annette Barrineau, Dean of Business)</a:t>
+            </a:r>
+          </a:p>
+          <a:p>
+            <a:endParaRPr lang="en-US"/>
+          </a:p>
+        </p:txBody>
+      </p:sp>
+      <p:sp>
+        <p:nvSpPr>
+          <p:cNvPr id="6" name="Title 1">
+            <a:extLst>
+              <a:ext uri="{FF2B5EF4-FFF2-40B4-BE49-F238E27FC236}">
+                <a16:creationId xmlns:a16="http://schemas.microsoft.com/office/drawing/2014/main" id="{CC5E1671-6C4F-4C67-5ED7-24D02A1C4FE1}"/>
+              </a:ext>
+            </a:extLst>
+          </p:cNvPr>
+          <p:cNvSpPr>
+            <a:spLocks noGrp="1"/>
+          </p:cNvSpPr>
+          <p:nvPr>
+            <p:ph type="title"/>
+          </p:nvPr>
+        </p:nvSpPr>
+        <p:spPr>
+          <a:xfrm>
+            <a:off x="838200" y="446813"/>
+            <a:ext cx="10515600" cy="807026"/>
+          </a:xfrm>
+        </p:spPr>
+        <p:txBody>
+          <a:bodyPr/>
+          <a:lstStyle/>
+          <a:p>
+            <a:r>
+              <a:rPr lang="en-US"/>
+              <a:t>Day 1 Summary</a:t>
+            </a:r>
+          </a:p>
+        </p:txBody>
+      </p:sp>
+    </p:spTree>
+    <p:extLst>
+      <p:ext uri="{BB962C8B-B14F-4D97-AF65-F5344CB8AC3E}">
+        <p14:creationId xmlns:p14="http://schemas.microsoft.com/office/powerpoint/2010/main" val="2199598826"/>
+      </p:ext>
+    </p:extLst>
+  </p:cSld>
+  <p:clrMapOvr>
+    <a:masterClrMapping/>
+  </p:clrMapOvr>
+</p:sld>
+</file>
+
+<file path=ppt/slides/slide20.xml><?xml version="1.0" encoding="utf-8"?>
 <p:sld xmlns:a="http://schemas.openxmlformats.org/drawingml/2006/main" xmlns:r="http://schemas.openxmlformats.org/officeDocument/2006/relationships" xmlns:p="http://schemas.openxmlformats.org/presentationml/2006/main">
   <p:cSld>
     <p:spTree>
@@ -4523,133 +5256,6 @@
 </p:sld>
 </file>
 
-<file path=ppt/slides/slide2.xml><?xml version="1.0" encoding="utf-8"?>
-<p:sld xmlns:a="http://schemas.openxmlformats.org/drawingml/2006/main" xmlns:r="http://schemas.openxmlformats.org/officeDocument/2006/relationships" xmlns:p="http://schemas.openxmlformats.org/presentationml/2006/main">
-  <p:cSld>
-    <p:spTree>
-      <p:nvGrpSpPr>
-        <p:cNvPr id="1" name=""/>
-        <p:cNvGrpSpPr/>
-        <p:nvPr/>
-      </p:nvGrpSpPr>
-      <p:grpSpPr>
-        <a:xfrm>
-          <a:off x="0" y="0"/>
-          <a:ext cx="0" cy="0"/>
-          <a:chOff x="0" y="0"/>
-          <a:chExt cx="0" cy="0"/>
-        </a:xfrm>
-      </p:grpSpPr>
-      <p:sp>
-        <p:nvSpPr>
-          <p:cNvPr id="6" name="Title 5">
-            <a:extLst>
-              <a:ext uri="{FF2B5EF4-FFF2-40B4-BE49-F238E27FC236}">
-                <a16:creationId xmlns:a16="http://schemas.microsoft.com/office/drawing/2014/main" id="{4D7CC2DE-7980-98EE-C2E0-773D65C4024B}"/>
-              </a:ext>
-            </a:extLst>
-          </p:cNvPr>
-          <p:cNvSpPr>
-            <a:spLocks noGrp="1"/>
-          </p:cNvSpPr>
-          <p:nvPr>
-            <p:ph type="title"/>
-          </p:nvPr>
-        </p:nvSpPr>
-        <p:spPr>
-          <a:xfrm>
-            <a:off x="838200" y="365126"/>
-            <a:ext cx="10515600" cy="702956"/>
-          </a:xfrm>
-        </p:spPr>
-        <p:txBody>
-          <a:bodyPr/>
-          <a:lstStyle/>
-          <a:p>
-            <a:r>
-              <a:rPr lang="en-US"/>
-              <a:t>A.S in Data Science Technology (2019)</a:t>
-            </a:r>
-          </a:p>
-        </p:txBody>
-      </p:sp>
-      <p:sp>
-        <p:nvSpPr>
-          <p:cNvPr id="2" name="TextBox 1">
-            <a:extLst>
-              <a:ext uri="{FF2B5EF4-FFF2-40B4-BE49-F238E27FC236}">
-                <a16:creationId xmlns:a16="http://schemas.microsoft.com/office/drawing/2014/main" id="{93DB0A15-0CD7-F268-B03E-26BD61E64D58}"/>
-              </a:ext>
-            </a:extLst>
-          </p:cNvPr>
-          <p:cNvSpPr txBox="1"/>
-          <p:nvPr/>
-        </p:nvSpPr>
-        <p:spPr>
-          <a:xfrm>
-            <a:off x="838200" y="5512249"/>
-            <a:ext cx="10005000" cy="369332"/>
-          </a:xfrm>
-          <a:prstGeom prst="rect">
-            <a:avLst/>
-          </a:prstGeom>
-          <a:noFill/>
-        </p:spPr>
-        <p:txBody>
-          <a:bodyPr wrap="square" rtlCol="0">
-            <a:spAutoFit/>
-          </a:bodyPr>
-          <a:lstStyle/>
-          <a:p>
-            <a:r>
-              <a:rPr lang="en-US"/>
-              <a:t>https://catalog.fscj.edu/preview_program.php?catoid=45&amp;poid=8178&amp;hl=2157</a:t>
-            </a:r>
-          </a:p>
-        </p:txBody>
-      </p:sp>
-      <p:pic>
-        <p:nvPicPr>
-          <p:cNvPr id="7" name="Content Placeholder 6">
-            <a:extLst>
-              <a:ext uri="{FF2B5EF4-FFF2-40B4-BE49-F238E27FC236}">
-                <a16:creationId xmlns:a16="http://schemas.microsoft.com/office/drawing/2014/main" id="{B89A3E2F-820C-81CA-B05D-383B897AF9C4}"/>
-              </a:ext>
-            </a:extLst>
-          </p:cNvPr>
-          <p:cNvPicPr>
-            <a:picLocks noGrp="1" noChangeAspect="1"/>
-          </p:cNvPicPr>
-          <p:nvPr>
-            <p:ph idx="1"/>
-          </p:nvPr>
-        </p:nvPicPr>
-        <p:blipFill>
-          <a:blip r:embed="rId2"/>
-          <a:stretch>
-            <a:fillRect/>
-          </a:stretch>
-        </p:blipFill>
-        <p:spPr>
-          <a:xfrm>
-            <a:off x="838200" y="1161085"/>
-            <a:ext cx="8601493" cy="4192571"/>
-          </a:xfrm>
-        </p:spPr>
-      </p:pic>
-    </p:spTree>
-    <p:extLst>
-      <p:ext uri="{BB962C8B-B14F-4D97-AF65-F5344CB8AC3E}">
-        <p14:creationId xmlns:p14="http://schemas.microsoft.com/office/powerpoint/2010/main" val="23151905"/>
-      </p:ext>
-    </p:extLst>
-  </p:cSld>
-  <p:clrMapOvr>
-    <a:masterClrMapping/>
-  </p:clrMapOvr>
-</p:sld>
-</file>
-
 <file path=ppt/slides/slide3.xml><?xml version="1.0" encoding="utf-8"?>
 <p:sld xmlns:a="http://schemas.openxmlformats.org/drawingml/2006/main" xmlns:r="http://schemas.openxmlformats.org/officeDocument/2006/relationships" xmlns:p="http://schemas.openxmlformats.org/presentationml/2006/main">
   <p:cSld>
@@ -4695,7 +5301,42 @@
           <a:p>
             <a:r>
               <a:rPr lang="en-US"/>
-              <a:t>Embedded Certificates</a:t>
+              <a:t>A.S in Data Science Technology (2019)</a:t>
+            </a:r>
+          </a:p>
+        </p:txBody>
+      </p:sp>
+      <p:sp>
+        <p:nvSpPr>
+          <p:cNvPr id="2" name="TextBox 1">
+            <a:extLst>
+              <a:ext uri="{FF2B5EF4-FFF2-40B4-BE49-F238E27FC236}">
+                <a16:creationId xmlns:a16="http://schemas.microsoft.com/office/drawing/2014/main" id="{93DB0A15-0CD7-F268-B03E-26BD61E64D58}"/>
+              </a:ext>
+            </a:extLst>
+          </p:cNvPr>
+          <p:cNvSpPr txBox="1"/>
+          <p:nvPr/>
+        </p:nvSpPr>
+        <p:spPr>
+          <a:xfrm>
+            <a:off x="838200" y="5512249"/>
+            <a:ext cx="10005000" cy="369332"/>
+          </a:xfrm>
+          <a:prstGeom prst="rect">
+            <a:avLst/>
+          </a:prstGeom>
+          <a:noFill/>
+        </p:spPr>
+        <p:txBody>
+          <a:bodyPr wrap="square" rtlCol="0">
+            <a:spAutoFit/>
+          </a:bodyPr>
+          <a:lstStyle/>
+          <a:p>
+            <a:r>
+              <a:rPr lang="en-US"/>
+              <a:t>https://catalog.fscj.edu/preview_program.php?catoid=45&amp;poid=8178&amp;hl=2157</a:t>
             </a:r>
           </a:p>
         </p:txBody>
@@ -4705,7 +5346,7 @@
           <p:cNvPr id="7" name="Content Placeholder 6">
             <a:extLst>
               <a:ext uri="{FF2B5EF4-FFF2-40B4-BE49-F238E27FC236}">
-                <a16:creationId xmlns:a16="http://schemas.microsoft.com/office/drawing/2014/main" id="{E56D22E1-E727-2100-A048-77B1F81CFC29}"/>
+                <a16:creationId xmlns:a16="http://schemas.microsoft.com/office/drawing/2014/main" id="{B89A3E2F-820C-81CA-B05D-383B897AF9C4}"/>
               </a:ext>
             </a:extLst>
           </p:cNvPr>
@@ -4724,85 +5365,15 @@
         </p:blipFill>
         <p:spPr>
           <a:xfrm>
-            <a:off x="903881" y="1340539"/>
-            <a:ext cx="11085250" cy="2230661"/>
+            <a:off x="838200" y="1161085"/>
+            <a:ext cx="8601493" cy="4192571"/>
           </a:xfrm>
         </p:spPr>
       </p:pic>
-      <p:sp>
-        <p:nvSpPr>
-          <p:cNvPr id="10" name="TextBox 9">
-            <a:extLst>
-              <a:ext uri="{FF2B5EF4-FFF2-40B4-BE49-F238E27FC236}">
-                <a16:creationId xmlns:a16="http://schemas.microsoft.com/office/drawing/2014/main" id="{F13DB577-F73C-F06C-DFFC-A83023BB75A9}"/>
-              </a:ext>
-            </a:extLst>
-          </p:cNvPr>
-          <p:cNvSpPr txBox="1"/>
-          <p:nvPr/>
-        </p:nvSpPr>
-        <p:spPr>
-          <a:xfrm>
-            <a:off x="903880" y="3921235"/>
-            <a:ext cx="7088119" cy="369332"/>
-          </a:xfrm>
-          <a:prstGeom prst="rect">
-            <a:avLst/>
-          </a:prstGeom>
-          <a:noFill/>
-        </p:spPr>
-        <p:txBody>
-          <a:bodyPr wrap="square">
-            <a:spAutoFit/>
-          </a:bodyPr>
-          <a:lstStyle/>
-          <a:p>
-            <a:r>
-              <a:rPr lang="en-US"/>
-              <a:t>https://catalog.fscj.edu/preview_program.php?catoid=45&amp;poid=8180</a:t>
-            </a:r>
-          </a:p>
-        </p:txBody>
-      </p:sp>
-      <p:sp>
-        <p:nvSpPr>
-          <p:cNvPr id="12" name="TextBox 11">
-            <a:extLst>
-              <a:ext uri="{FF2B5EF4-FFF2-40B4-BE49-F238E27FC236}">
-                <a16:creationId xmlns:a16="http://schemas.microsoft.com/office/drawing/2014/main" id="{CE097C53-F441-4499-47D9-E70B7AB86429}"/>
-              </a:ext>
-            </a:extLst>
-          </p:cNvPr>
-          <p:cNvSpPr txBox="1"/>
-          <p:nvPr/>
-        </p:nvSpPr>
-        <p:spPr>
-          <a:xfrm>
-            <a:off x="903880" y="4374835"/>
-            <a:ext cx="6677720" cy="369332"/>
-          </a:xfrm>
-          <a:prstGeom prst="rect">
-            <a:avLst/>
-          </a:prstGeom>
-          <a:noFill/>
-        </p:spPr>
-        <p:txBody>
-          <a:bodyPr wrap="square">
-            <a:spAutoFit/>
-          </a:bodyPr>
-          <a:lstStyle/>
-          <a:p>
-            <a:r>
-              <a:rPr lang="en-US"/>
-              <a:t>https://catalog.fscj.edu/preview_program.php?catoid=45&amp;poid=8275</a:t>
-            </a:r>
-          </a:p>
-        </p:txBody>
-      </p:sp>
     </p:spTree>
     <p:extLst>
       <p:ext uri="{BB962C8B-B14F-4D97-AF65-F5344CB8AC3E}">
-        <p14:creationId xmlns:p14="http://schemas.microsoft.com/office/powerpoint/2010/main" val="3074926017"/>
+        <p14:creationId xmlns:p14="http://schemas.microsoft.com/office/powerpoint/2010/main" val="23151905"/>
       </p:ext>
     </p:extLst>
   </p:cSld>
@@ -4831,10 +5402,10 @@
       </p:grpSpPr>
       <p:sp>
         <p:nvSpPr>
-          <p:cNvPr id="2" name="Title 1">
+          <p:cNvPr id="6" name="Title 5">
             <a:extLst>
               <a:ext uri="{FF2B5EF4-FFF2-40B4-BE49-F238E27FC236}">
-                <a16:creationId xmlns:a16="http://schemas.microsoft.com/office/drawing/2014/main" id="{65D993DC-B965-B84A-46D3-7A0CE61DAA8C}"/>
+                <a16:creationId xmlns:a16="http://schemas.microsoft.com/office/drawing/2014/main" id="{4D7CC2DE-7980-98EE-C2E0-773D65C4024B}"/>
               </a:ext>
             </a:extLst>
           </p:cNvPr>
@@ -4847,8 +5418,8 @@
         </p:nvSpPr>
         <p:spPr>
           <a:xfrm>
-            <a:off x="838200" y="345957"/>
-            <a:ext cx="10515600" cy="722124"/>
+            <a:off x="838200" y="365126"/>
+            <a:ext cx="10515600" cy="702956"/>
           </a:xfrm>
         </p:spPr>
         <p:txBody>
@@ -4857,65 +5428,26 @@
           <a:p>
             <a:r>
               <a:rPr lang="en-US"/>
-              <a:t>How Did We Get Here?</a:t>
-            </a:r>
-          </a:p>
-        </p:txBody>
-      </p:sp>
-      <p:sp>
-        <p:nvSpPr>
-          <p:cNvPr id="3" name="Content Placeholder 2">
+              <a:t>Embedded Certificates</a:t>
+            </a:r>
+          </a:p>
+        </p:txBody>
+      </p:sp>
+      <p:pic>
+        <p:nvPicPr>
+          <p:cNvPr id="7" name="Content Placeholder 6">
             <a:extLst>
               <a:ext uri="{FF2B5EF4-FFF2-40B4-BE49-F238E27FC236}">
-                <a16:creationId xmlns:a16="http://schemas.microsoft.com/office/drawing/2014/main" id="{B582D357-94B9-4B44-CB5A-5404D6CE72ED}"/>
-              </a:ext>
-            </a:extLst>
-          </p:cNvPr>
-          <p:cNvSpPr>
-            <a:spLocks noGrp="1"/>
-          </p:cNvSpPr>
-          <p:nvPr>
-            <p:ph idx="1"/>
-          </p:nvPr>
-        </p:nvSpPr>
-        <p:spPr>
-          <a:xfrm>
-            <a:off x="838200" y="1252497"/>
-            <a:ext cx="11104708" cy="4781181"/>
-          </a:xfrm>
-        </p:spPr>
-        <p:txBody>
-          <a:bodyPr>
-            <a:normAutofit/>
-          </a:bodyPr>
-          <a:lstStyle/>
-          <a:p>
-            <a:r>
-              <a:rPr lang="en-US" sz="2400"/>
-              <a:t>Start with the A.S. in Computer Information Technology (2018)</a:t>
-            </a:r>
-          </a:p>
-          <a:p>
-            <a:r>
-              <a:rPr lang="en-US" sz="2400"/>
-              <a:t>"Lay of the land" – the A.S. in Computer Information Technology program as we started designing the new program:</a:t>
-            </a:r>
-          </a:p>
-        </p:txBody>
-      </p:sp>
-      <p:pic>
-        <p:nvPicPr>
-          <p:cNvPr id="6" name="Content Placeholder 7">
-            <a:extLst>
-              <a:ext uri="{FF2B5EF4-FFF2-40B4-BE49-F238E27FC236}">
-                <a16:creationId xmlns:a16="http://schemas.microsoft.com/office/drawing/2014/main" id="{133C27C4-9E5E-C4D2-0B6B-92CFFDA2B716}"/>
+                <a16:creationId xmlns:a16="http://schemas.microsoft.com/office/drawing/2014/main" id="{E56D22E1-E727-2100-A048-77B1F81CFC29}"/>
               </a:ext>
             </a:extLst>
           </p:cNvPr>
           <p:cNvPicPr>
-            <a:picLocks noChangeAspect="1"/>
+            <a:picLocks noGrp="1" noChangeAspect="1"/>
           </p:cNvPicPr>
-          <p:nvPr/>
+          <p:nvPr>
+            <p:ph idx="1"/>
+          </p:nvPr>
         </p:nvPicPr>
         <p:blipFill>
           <a:blip r:embed="rId2"/>
@@ -4925,21 +5457,85 @@
         </p:blipFill>
         <p:spPr>
           <a:xfrm>
-            <a:off x="1693587" y="2558958"/>
-            <a:ext cx="7294785" cy="3474720"/>
+            <a:off x="903881" y="1340539"/>
+            <a:ext cx="11085250" cy="2230661"/>
+          </a:xfrm>
+        </p:spPr>
+      </p:pic>
+      <p:sp>
+        <p:nvSpPr>
+          <p:cNvPr id="10" name="TextBox 9">
+            <a:extLst>
+              <a:ext uri="{FF2B5EF4-FFF2-40B4-BE49-F238E27FC236}">
+                <a16:creationId xmlns:a16="http://schemas.microsoft.com/office/drawing/2014/main" id="{F13DB577-F73C-F06C-DFFC-A83023BB75A9}"/>
+              </a:ext>
+            </a:extLst>
+          </p:cNvPr>
+          <p:cNvSpPr txBox="1"/>
+          <p:nvPr/>
+        </p:nvSpPr>
+        <p:spPr>
+          <a:xfrm>
+            <a:off x="903880" y="3921235"/>
+            <a:ext cx="7088119" cy="369332"/>
           </a:xfrm>
           <a:prstGeom prst="rect">
             <a:avLst/>
           </a:prstGeom>
-          <a:ln>
-            <a:noFill/>
-          </a:ln>
-        </p:spPr>
-      </p:pic>
+          <a:noFill/>
+        </p:spPr>
+        <p:txBody>
+          <a:bodyPr wrap="square">
+            <a:spAutoFit/>
+          </a:bodyPr>
+          <a:lstStyle/>
+          <a:p>
+            <a:r>
+              <a:rPr lang="en-US"/>
+              <a:t>https://catalog.fscj.edu/preview_program.php?catoid=45&amp;poid=8180</a:t>
+            </a:r>
+          </a:p>
+        </p:txBody>
+      </p:sp>
+      <p:sp>
+        <p:nvSpPr>
+          <p:cNvPr id="12" name="TextBox 11">
+            <a:extLst>
+              <a:ext uri="{FF2B5EF4-FFF2-40B4-BE49-F238E27FC236}">
+                <a16:creationId xmlns:a16="http://schemas.microsoft.com/office/drawing/2014/main" id="{CE097C53-F441-4499-47D9-E70B7AB86429}"/>
+              </a:ext>
+            </a:extLst>
+          </p:cNvPr>
+          <p:cNvSpPr txBox="1"/>
+          <p:nvPr/>
+        </p:nvSpPr>
+        <p:spPr>
+          <a:xfrm>
+            <a:off x="903880" y="4374835"/>
+            <a:ext cx="6677720" cy="369332"/>
+          </a:xfrm>
+          <a:prstGeom prst="rect">
+            <a:avLst/>
+          </a:prstGeom>
+          <a:noFill/>
+        </p:spPr>
+        <p:txBody>
+          <a:bodyPr wrap="square">
+            <a:spAutoFit/>
+          </a:bodyPr>
+          <a:lstStyle/>
+          <a:p>
+            <a:r>
+              <a:rPr lang="en-US"/>
+              <a:t>https://catalog.fscj.edu/preview_program.php?catoid=45&amp;poid=8275</a:t>
+            </a:r>
+          </a:p>
+        </p:txBody>
+      </p:sp>
     </p:spTree>
     <p:extLst>
       <p:ext uri="{BB962C8B-B14F-4D97-AF65-F5344CB8AC3E}">
-        <p14:creationId xmlns:p14="http://schemas.microsoft.com/office/powerpoint/2010/main" val="863265983"/>
+        <p14:creationId xmlns:p14="http://schemas.microsoft.com/office/powerpoint/2010/main" val="3074926017"/>
       </p:ext>
     </p:extLst>
   </p:cSld>
@@ -4994,7 +5590,7 @@
           <a:p>
             <a:r>
               <a:rPr lang="en-US"/>
-              <a:t>Substantive Changes</a:t>
+              <a:t>How Did We Get Here?</a:t>
             </a:r>
           </a:p>
         </p:txBody>
@@ -5018,7 +5614,7 @@
         <p:spPr>
           <a:xfrm>
             <a:off x="838200" y="1252497"/>
-            <a:ext cx="11104708" cy="4717997"/>
+            <a:ext cx="11104708" cy="4781181"/>
           </a:xfrm>
         </p:spPr>
         <p:txBody>
@@ -5027,27 +5623,25 @@
           </a:bodyPr>
           <a:lstStyle/>
           <a:p>
-            <a:pPr marL="346075" lvl="1"/>
-            <a:r>
-              <a:rPr lang="en-US" sz="2800"/>
-              <a:t>Substantive changes in Florida can result in extended time periods for approval of a new program</a:t>
-            </a:r>
-            <a:endParaRPr lang="en-US"/>
-          </a:p>
-          <a:p>
-            <a:endParaRPr lang="en-US"/>
-          </a:p>
-          <a:p>
-            <a:endParaRPr lang="en-US"/>
+            <a:r>
+              <a:rPr lang="en-US" sz="2400"/>
+              <a:t>Start with the A.S. in Computer Information Technology (2018)</a:t>
+            </a:r>
+          </a:p>
+          <a:p>
+            <a:r>
+              <a:rPr lang="en-US" sz="2400"/>
+              <a:t>"Lay of the land" – the A.S. in Computer Information Technology program as we started designing the new program:</a:t>
+            </a:r>
           </a:p>
         </p:txBody>
       </p:sp>
       <p:pic>
         <p:nvPicPr>
-          <p:cNvPr id="5" name="Picture 4">
+          <p:cNvPr id="6" name="Content Placeholder 7">
             <a:extLst>
               <a:ext uri="{FF2B5EF4-FFF2-40B4-BE49-F238E27FC236}">
-                <a16:creationId xmlns:a16="http://schemas.microsoft.com/office/drawing/2014/main" id="{EF735E72-6746-EF69-1546-74AE67E573CF}"/>
+                <a16:creationId xmlns:a16="http://schemas.microsoft.com/office/drawing/2014/main" id="{133C27C4-9E5E-C4D2-0B6B-92CFFDA2B716}"/>
               </a:ext>
             </a:extLst>
           </p:cNvPr>
@@ -5064,18 +5658,21 @@
         </p:blipFill>
         <p:spPr>
           <a:xfrm>
-            <a:off x="1893060" y="2244976"/>
-            <a:ext cx="8188637" cy="3725518"/>
+            <a:off x="1693587" y="2558958"/>
+            <a:ext cx="7294785" cy="3474720"/>
           </a:xfrm>
           <a:prstGeom prst="rect">
             <a:avLst/>
           </a:prstGeom>
+          <a:ln>
+            <a:noFill/>
+          </a:ln>
         </p:spPr>
       </p:pic>
     </p:spTree>
     <p:extLst>
       <p:ext uri="{BB962C8B-B14F-4D97-AF65-F5344CB8AC3E}">
-        <p14:creationId xmlns:p14="http://schemas.microsoft.com/office/powerpoint/2010/main" val="957855513"/>
+        <p14:creationId xmlns:p14="http://schemas.microsoft.com/office/powerpoint/2010/main" val="863265983"/>
       </p:ext>
     </p:extLst>
   </p:cSld>
@@ -5154,7 +5751,7 @@
         <p:spPr>
           <a:xfrm>
             <a:off x="838200" y="1252497"/>
-            <a:ext cx="11104708" cy="4596765"/>
+            <a:ext cx="11104708" cy="4717997"/>
           </a:xfrm>
         </p:spPr>
         <p:txBody>
@@ -5166,39 +5763,8 @@
             <a:pPr marL="346075" lvl="1"/>
             <a:r>
               <a:rPr lang="en-US" sz="2800"/>
-              <a:t>To avoid the "substantive change" categorization for our new program, we examined the department's curriculum landscape to see where we could lay the groundwork for a "non-substantive" design by integrating data science outcomes into existing courses and including them in a temporary track in an existing program.</a:t>
-            </a:r>
-          </a:p>
-          <a:p>
-            <a:pPr marL="346075" lvl="1"/>
-            <a:r>
-              <a:rPr lang="en-US" sz="2800"/>
-              <a:t>New learning outcomes were added to the following courses:</a:t>
-            </a:r>
-            <a:endParaRPr lang="en-US" sz="1000"/>
-          </a:p>
-          <a:p>
-            <a:pPr marL="803275" lvl="2"/>
-            <a:r>
-              <a:rPr lang="en-US" sz="2400"/>
-              <a:t>Introduction to Information Technology</a:t>
-            </a:r>
-          </a:p>
-          <a:p>
-            <a:pPr marL="803275" lvl="2"/>
-            <a:r>
-              <a:rPr lang="en-US" sz="2400"/>
-              <a:t>Programming in Python</a:t>
-            </a:r>
-          </a:p>
-          <a:p>
-            <a:pPr marL="803275" lvl="2"/>
-            <a:r>
-              <a:rPr lang="en-US" sz="2400"/>
-              <a:t>Computer Networks and Telecommunications</a:t>
-            </a:r>
-          </a:p>
-          <a:p>
+              <a:t>Substantive changes in Florida can result in extended time periods for approval of a new program</a:t>
+            </a:r>
             <a:endParaRPr lang="en-US"/>
           </a:p>
           <a:p>
@@ -5209,10 +5775,40 @@
           </a:p>
         </p:txBody>
       </p:sp>
+      <p:pic>
+        <p:nvPicPr>
+          <p:cNvPr id="5" name="Picture 4">
+            <a:extLst>
+              <a:ext uri="{FF2B5EF4-FFF2-40B4-BE49-F238E27FC236}">
+                <a16:creationId xmlns:a16="http://schemas.microsoft.com/office/drawing/2014/main" id="{EF735E72-6746-EF69-1546-74AE67E573CF}"/>
+              </a:ext>
+            </a:extLst>
+          </p:cNvPr>
+          <p:cNvPicPr>
+            <a:picLocks noChangeAspect="1"/>
+          </p:cNvPicPr>
+          <p:nvPr/>
+        </p:nvPicPr>
+        <p:blipFill>
+          <a:blip r:embed="rId2"/>
+          <a:stretch>
+            <a:fillRect/>
+          </a:stretch>
+        </p:blipFill>
+        <p:spPr>
+          <a:xfrm>
+            <a:off x="1893060" y="2244976"/>
+            <a:ext cx="8188637" cy="3725518"/>
+          </a:xfrm>
+          <a:prstGeom prst="rect">
+            <a:avLst/>
+          </a:prstGeom>
+        </p:spPr>
+      </p:pic>
     </p:spTree>
     <p:extLst>
       <p:ext uri="{BB962C8B-B14F-4D97-AF65-F5344CB8AC3E}">
-        <p14:creationId xmlns:p14="http://schemas.microsoft.com/office/powerpoint/2010/main" val="1647258164"/>
+        <p14:creationId xmlns:p14="http://schemas.microsoft.com/office/powerpoint/2010/main" val="957855513"/>
       </p:ext>
     </p:extLst>
   </p:cSld>
@@ -5267,6 +5863,143 @@
           <a:p>
             <a:r>
               <a:rPr lang="en-US"/>
+              <a:t>Substantive Changes</a:t>
+            </a:r>
+          </a:p>
+        </p:txBody>
+      </p:sp>
+      <p:sp>
+        <p:nvSpPr>
+          <p:cNvPr id="3" name="Content Placeholder 2">
+            <a:extLst>
+              <a:ext uri="{FF2B5EF4-FFF2-40B4-BE49-F238E27FC236}">
+                <a16:creationId xmlns:a16="http://schemas.microsoft.com/office/drawing/2014/main" id="{B582D357-94B9-4B44-CB5A-5404D6CE72ED}"/>
+              </a:ext>
+            </a:extLst>
+          </p:cNvPr>
+          <p:cNvSpPr>
+            <a:spLocks noGrp="1"/>
+          </p:cNvSpPr>
+          <p:nvPr>
+            <p:ph idx="1"/>
+          </p:nvPr>
+        </p:nvSpPr>
+        <p:spPr>
+          <a:xfrm>
+            <a:off x="838200" y="1252497"/>
+            <a:ext cx="11104708" cy="4596765"/>
+          </a:xfrm>
+        </p:spPr>
+        <p:txBody>
+          <a:bodyPr>
+            <a:normAutofit/>
+          </a:bodyPr>
+          <a:lstStyle/>
+          <a:p>
+            <a:pPr marL="346075" lvl="1"/>
+            <a:r>
+              <a:rPr lang="en-US" sz="2800"/>
+              <a:t>To avoid the "substantive change" categorization for our new program, we examined the department's curriculum landscape to see where we could lay the groundwork for a "non-substantive" design by integrating data science outcomes into existing courses and including them in a temporary track in an existing program.</a:t>
+            </a:r>
+          </a:p>
+          <a:p>
+            <a:pPr marL="346075" lvl="1"/>
+            <a:r>
+              <a:rPr lang="en-US" sz="2800"/>
+              <a:t>New learning outcomes were added to the following courses:</a:t>
+            </a:r>
+            <a:endParaRPr lang="en-US" sz="1000"/>
+          </a:p>
+          <a:p>
+            <a:pPr marL="803275" lvl="2"/>
+            <a:r>
+              <a:rPr lang="en-US" sz="2400"/>
+              <a:t>Introduction to Information Technology</a:t>
+            </a:r>
+          </a:p>
+          <a:p>
+            <a:pPr marL="803275" lvl="2"/>
+            <a:r>
+              <a:rPr lang="en-US" sz="2400"/>
+              <a:t>Programming in Python</a:t>
+            </a:r>
+          </a:p>
+          <a:p>
+            <a:pPr marL="803275" lvl="2"/>
+            <a:r>
+              <a:rPr lang="en-US" sz="2400"/>
+              <a:t>Computer Networks and Telecommunications</a:t>
+            </a:r>
+          </a:p>
+          <a:p>
+            <a:endParaRPr lang="en-US"/>
+          </a:p>
+          <a:p>
+            <a:endParaRPr lang="en-US"/>
+          </a:p>
+          <a:p>
+            <a:endParaRPr lang="en-US"/>
+          </a:p>
+        </p:txBody>
+      </p:sp>
+    </p:spTree>
+    <p:extLst>
+      <p:ext uri="{BB962C8B-B14F-4D97-AF65-F5344CB8AC3E}">
+        <p14:creationId xmlns:p14="http://schemas.microsoft.com/office/powerpoint/2010/main" val="1647258164"/>
+      </p:ext>
+    </p:extLst>
+  </p:cSld>
+  <p:clrMapOvr>
+    <a:masterClrMapping/>
+  </p:clrMapOvr>
+</p:sld>
+</file>
+
+<file path=ppt/slides/slide8.xml><?xml version="1.0" encoding="utf-8"?>
+<p:sld xmlns:a="http://schemas.openxmlformats.org/drawingml/2006/main" xmlns:r="http://schemas.openxmlformats.org/officeDocument/2006/relationships" xmlns:p="http://schemas.openxmlformats.org/presentationml/2006/main">
+  <p:cSld>
+    <p:spTree>
+      <p:nvGrpSpPr>
+        <p:cNvPr id="1" name=""/>
+        <p:cNvGrpSpPr/>
+        <p:nvPr/>
+      </p:nvGrpSpPr>
+      <p:grpSpPr>
+        <a:xfrm>
+          <a:off x="0" y="0"/>
+          <a:ext cx="0" cy="0"/>
+          <a:chOff x="0" y="0"/>
+          <a:chExt cx="0" cy="0"/>
+        </a:xfrm>
+      </p:grpSpPr>
+      <p:sp>
+        <p:nvSpPr>
+          <p:cNvPr id="2" name="Title 1">
+            <a:extLst>
+              <a:ext uri="{FF2B5EF4-FFF2-40B4-BE49-F238E27FC236}">
+                <a16:creationId xmlns:a16="http://schemas.microsoft.com/office/drawing/2014/main" id="{65D993DC-B965-B84A-46D3-7A0CE61DAA8C}"/>
+              </a:ext>
+            </a:extLst>
+          </p:cNvPr>
+          <p:cNvSpPr>
+            <a:spLocks noGrp="1"/>
+          </p:cNvSpPr>
+          <p:nvPr>
+            <p:ph type="title"/>
+          </p:nvPr>
+        </p:nvSpPr>
+        <p:spPr>
+          <a:xfrm>
+            <a:off x="838200" y="345957"/>
+            <a:ext cx="10515600" cy="722124"/>
+          </a:xfrm>
+        </p:spPr>
+        <p:txBody>
+          <a:bodyPr/>
+          <a:lstStyle/>
+          <a:p>
+            <a:r>
+              <a:rPr lang="en-US"/>
               <a:t>A.S. Computer Information Technology 2018</a:t>
             </a:r>
           </a:p>
@@ -5376,7 +6109,7 @@
 </p:sld>
 </file>
 
-<file path=ppt/slides/slide8.xml><?xml version="1.0" encoding="utf-8"?>
+<file path=ppt/slides/slide9.xml><?xml version="1.0" encoding="utf-8"?>
 <p:sld xmlns:a="http://schemas.openxmlformats.org/drawingml/2006/main" xmlns:r="http://schemas.openxmlformats.org/officeDocument/2006/relationships" xmlns:p="http://schemas.openxmlformats.org/presentationml/2006/main">
   <p:cSld>
     <p:spTree>
@@ -5760,238 +6493,6 @@
     <p:extLst>
       <p:ext uri="{BB962C8B-B14F-4D97-AF65-F5344CB8AC3E}">
         <p14:creationId xmlns:p14="http://schemas.microsoft.com/office/powerpoint/2010/main" val="1006224730"/>
-      </p:ext>
-    </p:extLst>
-  </p:cSld>
-  <p:clrMapOvr>
-    <a:masterClrMapping/>
-  </p:clrMapOvr>
-</p:sld>
-</file>
-
-<file path=ppt/slides/slide9.xml><?xml version="1.0" encoding="utf-8"?>
-<p:sld xmlns:a="http://schemas.openxmlformats.org/drawingml/2006/main" xmlns:r="http://schemas.openxmlformats.org/officeDocument/2006/relationships" xmlns:p="http://schemas.openxmlformats.org/presentationml/2006/main">
-  <p:cSld>
-    <p:spTree>
-      <p:nvGrpSpPr>
-        <p:cNvPr id="1" name=""/>
-        <p:cNvGrpSpPr/>
-        <p:nvPr/>
-      </p:nvGrpSpPr>
-      <p:grpSpPr>
-        <a:xfrm>
-          <a:off x="0" y="0"/>
-          <a:ext cx="0" cy="0"/>
-          <a:chOff x="0" y="0"/>
-          <a:chExt cx="0" cy="0"/>
-        </a:xfrm>
-      </p:grpSpPr>
-      <p:sp>
-        <p:nvSpPr>
-          <p:cNvPr id="2" name="Title 1">
-            <a:extLst>
-              <a:ext uri="{FF2B5EF4-FFF2-40B4-BE49-F238E27FC236}">
-                <a16:creationId xmlns:a16="http://schemas.microsoft.com/office/drawing/2014/main" id="{65D993DC-B965-B84A-46D3-7A0CE61DAA8C}"/>
-              </a:ext>
-            </a:extLst>
-          </p:cNvPr>
-          <p:cNvSpPr>
-            <a:spLocks noGrp="1"/>
-          </p:cNvSpPr>
-          <p:nvPr>
-            <p:ph type="title"/>
-          </p:nvPr>
-        </p:nvSpPr>
-        <p:spPr>
-          <a:xfrm>
-            <a:off x="838200" y="345957"/>
-            <a:ext cx="10515600" cy="722124"/>
-          </a:xfrm>
-        </p:spPr>
-        <p:txBody>
-          <a:bodyPr/>
-          <a:lstStyle/>
-          <a:p>
-            <a:r>
-              <a:rPr lang="en-US"/>
-              <a:t>Data Science Track</a:t>
-            </a:r>
-          </a:p>
-        </p:txBody>
-      </p:sp>
-      <p:sp>
-        <p:nvSpPr>
-          <p:cNvPr id="3" name="Content Placeholder 2">
-            <a:extLst>
-              <a:ext uri="{FF2B5EF4-FFF2-40B4-BE49-F238E27FC236}">
-                <a16:creationId xmlns:a16="http://schemas.microsoft.com/office/drawing/2014/main" id="{B582D357-94B9-4B44-CB5A-5404D6CE72ED}"/>
-              </a:ext>
-            </a:extLst>
-          </p:cNvPr>
-          <p:cNvSpPr>
-            <a:spLocks noGrp="1"/>
-          </p:cNvSpPr>
-          <p:nvPr>
-            <p:ph idx="1"/>
-          </p:nvPr>
-        </p:nvSpPr>
-        <p:spPr>
-          <a:xfrm>
-            <a:off x="838200" y="1160289"/>
-            <a:ext cx="11104708" cy="4688973"/>
-          </a:xfrm>
-        </p:spPr>
-        <p:txBody>
-          <a:bodyPr>
-            <a:normAutofit/>
-          </a:bodyPr>
-          <a:lstStyle/>
-          <a:p>
-            <a:r>
-              <a:rPr lang="en-US"/>
-              <a:t>Added to the CIT program in 2018</a:t>
-            </a:r>
-          </a:p>
-          <a:p>
-            <a:r>
-              <a:rPr lang="en-US"/>
-              <a:t>9 Credit Hours, 3 Courses Minimum (prerequisites not listed)</a:t>
-            </a:r>
-            <a:endParaRPr lang="en-US" sz="2000"/>
-          </a:p>
-          <a:p>
-            <a:pPr lvl="1"/>
-            <a:r>
-              <a:rPr lang="en-US" b="1">
-                <a:solidFill>
-                  <a:srgbClr val="002060"/>
-                </a:solidFill>
-              </a:rPr>
-              <a:t>CIS 2349C - Introduction to Big Data Using Hadoop </a:t>
-            </a:r>
-            <a:r>
-              <a:rPr lang="en-US" b="1">
-                <a:solidFill>
-                  <a:schemeClr val="accent2">
-                    <a:lumMod val="75000"/>
-                  </a:schemeClr>
-                </a:solidFill>
-              </a:rPr>
-              <a:t>(New)</a:t>
-            </a:r>
-          </a:p>
-          <a:p>
-            <a:pPr lvl="1"/>
-            <a:r>
-              <a:rPr lang="en-US" b="1">
-                <a:solidFill>
-                  <a:srgbClr val="002060"/>
-                </a:solidFill>
-              </a:rPr>
-              <a:t>COP 2034C - Programming in Python</a:t>
-            </a:r>
-          </a:p>
-          <a:p>
-            <a:pPr lvl="1"/>
-            <a:r>
-              <a:rPr lang="en-US" b="1">
-                <a:solidFill>
-                  <a:srgbClr val="002060"/>
-                </a:solidFill>
-              </a:rPr>
-              <a:t>COP 2551C - Introduction to Object-Oriented Programming with Java</a:t>
-            </a:r>
-          </a:p>
-          <a:p>
-            <a:pPr lvl="1"/>
-            <a:r>
-              <a:rPr lang="en-US" b="1">
-                <a:solidFill>
-                  <a:srgbClr val="002060"/>
-                </a:solidFill>
-              </a:rPr>
-              <a:t>COP 2073C - Introduction to Statistical Programming with R </a:t>
-            </a:r>
-            <a:r>
-              <a:rPr lang="en-US" b="1">
-                <a:solidFill>
-                  <a:schemeClr val="accent2">
-                    <a:lumMod val="75000"/>
-                  </a:schemeClr>
-                </a:solidFill>
-              </a:rPr>
-              <a:t>(New)</a:t>
-            </a:r>
-          </a:p>
-          <a:p>
-            <a:pPr lvl="2"/>
-            <a:r>
-              <a:rPr lang="en-US" b="1">
-                <a:solidFill>
-                  <a:srgbClr val="002060"/>
-                </a:solidFill>
-              </a:rPr>
-              <a:t>Note: Students must complete STA 2023 prior to enrollment in this course.</a:t>
-            </a:r>
-          </a:p>
-          <a:p>
-            <a:pPr lvl="1"/>
-            <a:r>
-              <a:rPr lang="en-US" b="1">
-                <a:solidFill>
-                  <a:srgbClr val="002060"/>
-                </a:solidFill>
-              </a:rPr>
-              <a:t>CAP 2787C - Data Warehousing </a:t>
-            </a:r>
-            <a:r>
-              <a:rPr lang="en-US" b="1">
-                <a:solidFill>
-                  <a:schemeClr val="accent2">
-                    <a:lumMod val="75000"/>
-                  </a:schemeClr>
-                </a:solidFill>
-              </a:rPr>
-              <a:t>(derived from 4000-level BI course)</a:t>
-            </a:r>
-          </a:p>
-          <a:p>
-            <a:pPr lvl="1"/>
-            <a:r>
-              <a:rPr lang="en-US" b="1">
-                <a:solidFill>
-                  <a:srgbClr val="002060"/>
-                </a:solidFill>
-              </a:rPr>
-              <a:t>CTS 2456C - Introduction to SAS Programming </a:t>
-            </a:r>
-            <a:r>
-              <a:rPr lang="en-US" b="1">
-                <a:solidFill>
-                  <a:schemeClr val="accent2">
-                    <a:lumMod val="75000"/>
-                  </a:schemeClr>
-                </a:solidFill>
-              </a:rPr>
-              <a:t>(New)</a:t>
-            </a:r>
-          </a:p>
-          <a:p>
-            <a:r>
-              <a:rPr lang="en-US" sz="2800"/>
-              <a:t>In 2021 the track was removed since the A.S. in Data Science Technology program implementation was complete</a:t>
-            </a:r>
-            <a:endParaRPr lang="en-US"/>
-          </a:p>
-          <a:p>
-            <a:endParaRPr lang="en-US"/>
-          </a:p>
-        </p:txBody>
-      </p:sp>
-    </p:spTree>
-    <p:extLst>
-      <p:ext uri="{BB962C8B-B14F-4D97-AF65-F5344CB8AC3E}">
-        <p14:creationId xmlns:p14="http://schemas.microsoft.com/office/powerpoint/2010/main" val="3607543803"/>
       </p:ext>
     </p:extLst>
   </p:cSld>

</xml_diff>

<commit_message>
added data warehousing to agenda, added KSA spreadsheets
</commit_message>
<xml_diff>
--- a/slides/day1.pptx
+++ b/slides/day1.pptx
@@ -622,7 +622,7 @@
           <a:p>
             <a:fld id="{9D8A2B0D-E315-41D0-B099-3ED602A8C128}" type="datetimeFigureOut">
               <a:rPr lang="en-US" smtClean="0"/>
-              <a:t>7/14/2023</a:t>
+              <a:t>7/15/2023</a:t>
             </a:fld>
             <a:endParaRPr lang="en-US"/>
           </a:p>
@@ -1969,7 +1969,7 @@
           <a:p>
             <a:fld id="{9D8A2B0D-E315-41D0-B099-3ED602A8C128}" type="datetimeFigureOut">
               <a:rPr lang="en-US" smtClean="0"/>
-              <a:t>7/14/2023</a:t>
+              <a:t>7/15/2023</a:t>
             </a:fld>
             <a:endParaRPr lang="en-US"/>
           </a:p>
@@ -4732,8 +4732,8 @@
         </p:nvSpPr>
         <p:spPr>
           <a:xfrm>
-            <a:off x="838200" y="1537855"/>
-            <a:ext cx="10515600" cy="4311407"/>
+            <a:off x="838200" y="1101437"/>
+            <a:ext cx="10515600" cy="4747826"/>
           </a:xfrm>
         </p:spPr>
         <p:txBody>
@@ -4783,7 +4783,7 @@
               </a:spcAft>
             </a:pPr>
             <a:r>
-              <a:rPr lang="en-US" sz="2600" b="1">
+              <a:rPr lang="en-US" b="1">
                 <a:latin typeface="Calibri" panose="020F0502020204030204" pitchFamily="34" charset="0"/>
                 <a:ea typeface="Calibri" panose="020F0502020204030204" pitchFamily="34" charset="0"/>
               </a:rPr>
@@ -4797,7 +4797,7 @@
               </a:spcBef>
             </a:pPr>
             <a:r>
-              <a:rPr lang="en-US" sz="1900">
+              <a:rPr lang="en-US" sz="2100">
                 <a:effectLst/>
                 <a:latin typeface="Calibri" panose="020F0502020204030204" pitchFamily="34" charset="0"/>
                 <a:ea typeface="Calibri" panose="020F0502020204030204" pitchFamily="34" charset="0"/>
@@ -4812,7 +4812,7 @@
               </a:spcBef>
             </a:pPr>
             <a:r>
-              <a:rPr lang="en-US" sz="1900">
+              <a:rPr lang="en-US" sz="2100">
                 <a:effectLst/>
                 <a:latin typeface="Calibri" panose="020F0502020204030204" pitchFamily="34" charset="0"/>
                 <a:ea typeface="Calibri" panose="020F0502020204030204" pitchFamily="34" charset="0"/>
@@ -4827,7 +4827,7 @@
               </a:spcBef>
             </a:pPr>
             <a:r>
-              <a:rPr lang="en-US" sz="1900">
+              <a:rPr lang="en-US" sz="2100">
                 <a:effectLst/>
                 <a:latin typeface="Calibri" panose="020F0502020204030204" pitchFamily="34" charset="0"/>
                 <a:ea typeface="Calibri" panose="020F0502020204030204" pitchFamily="34" charset="0"/>
@@ -4842,7 +4842,7 @@
               </a:spcBef>
             </a:pPr>
             <a:r>
-              <a:rPr lang="en-US" sz="1900">
+              <a:rPr lang="en-US" sz="2100">
                 <a:effectLst/>
                 <a:latin typeface="Calibri" panose="020F0502020204030204" pitchFamily="34" charset="0"/>
                 <a:ea typeface="Calibri" panose="020F0502020204030204" pitchFamily="34" charset="0"/>
@@ -4857,7 +4857,7 @@
               </a:spcBef>
             </a:pPr>
             <a:r>
-              <a:rPr lang="en-US" sz="1900">
+              <a:rPr lang="en-US" sz="2100">
                 <a:effectLst/>
                 <a:latin typeface="Calibri" panose="020F0502020204030204" pitchFamily="34" charset="0"/>
                 <a:ea typeface="Calibri" panose="020F0502020204030204" pitchFamily="34" charset="0"/>
@@ -4872,14 +4872,14 @@
               </a:spcBef>
             </a:pPr>
             <a:r>
-              <a:rPr lang="en-US" sz="1900">
+              <a:rPr lang="en-US" sz="2100">
                 <a:effectLst/>
                 <a:latin typeface="Calibri" panose="020F0502020204030204" pitchFamily="34" charset="0"/>
                 <a:ea typeface="Calibri" panose="020F0502020204030204" pitchFamily="34" charset="0"/>
               </a:rPr>
               <a:t>Reimbursement</a:t>
             </a:r>
-            <a:endParaRPr lang="en-US" sz="1500">
+            <a:endParaRPr lang="en-US" sz="1600">
               <a:effectLst/>
               <a:latin typeface="Calibri" panose="020F0502020204030204" pitchFamily="34" charset="0"/>
               <a:ea typeface="Calibri" panose="020F0502020204030204" pitchFamily="34" charset="0"/>
@@ -4892,7 +4892,7 @@
               </a:spcBef>
             </a:pPr>
             <a:r>
-              <a:rPr lang="en-US" sz="1900">
+              <a:rPr lang="en-US" sz="2100">
                 <a:effectLst/>
                 <a:latin typeface="Calibri" panose="020F0502020204030204" pitchFamily="34" charset="0"/>
                 <a:ea typeface="Calibri" panose="020F0502020204030204" pitchFamily="34" charset="0"/>
@@ -4907,7 +4907,7 @@
               </a:spcBef>
             </a:pPr>
             <a:r>
-              <a:rPr lang="en-US" sz="1900">
+              <a:rPr lang="en-US" sz="2100">
                 <a:effectLst/>
                 <a:latin typeface="Calibri" panose="020F0502020204030204" pitchFamily="34" charset="0"/>
                 <a:ea typeface="Calibri" panose="020F0502020204030204" pitchFamily="34" charset="0"/>
@@ -4922,7 +4922,7 @@
               </a:spcBef>
             </a:pPr>
             <a:r>
-              <a:rPr lang="en-US" sz="1900">
+              <a:rPr lang="en-US" sz="2100">
                 <a:effectLst/>
                 <a:latin typeface="Calibri" panose="020F0502020204030204" pitchFamily="34" charset="0"/>
                 <a:ea typeface="Calibri" panose="020F0502020204030204" pitchFamily="34" charset="0"/>
@@ -4937,7 +4937,7 @@
               </a:spcBef>
             </a:pPr>
             <a:r>
-              <a:rPr lang="en-US" sz="1900">
+              <a:rPr lang="en-US" sz="2100">
                 <a:effectLst/>
                 <a:latin typeface="Calibri" panose="020F0502020204030204" pitchFamily="34" charset="0"/>
                 <a:ea typeface="Calibri" panose="020F0502020204030204" pitchFamily="34" charset="0"/>
@@ -4952,7 +4952,7 @@
               </a:spcBef>
             </a:pPr>
             <a:r>
-              <a:rPr lang="en-US" sz="1900">
+              <a:rPr lang="en-US" sz="2100">
                 <a:effectLst/>
                 <a:latin typeface="Calibri" panose="020F0502020204030204" pitchFamily="34" charset="0"/>
                 <a:ea typeface="Calibri" panose="020F0502020204030204" pitchFamily="34" charset="0"/>
@@ -4967,7 +4967,7 @@
               </a:spcBef>
             </a:pPr>
             <a:r>
-              <a:rPr lang="en-US" sz="1900">
+              <a:rPr lang="en-US" sz="2100">
                 <a:effectLst/>
                 <a:latin typeface="Calibri" panose="020F0502020204030204" pitchFamily="34" charset="0"/>
                 <a:ea typeface="Calibri" panose="020F0502020204030204" pitchFamily="34" charset="0"/>
@@ -4982,7 +4982,7 @@
               </a:spcBef>
             </a:pPr>
             <a:r>
-              <a:rPr lang="en-US" sz="1900">
+              <a:rPr lang="en-US" sz="2100">
                 <a:latin typeface="Calibri" panose="020F0502020204030204" pitchFamily="34" charset="0"/>
                 <a:ea typeface="Calibri" panose="020F0502020204030204" pitchFamily="34" charset="0"/>
               </a:rPr>
@@ -4996,7 +4996,7 @@
               </a:spcBef>
             </a:pPr>
             <a:r>
-              <a:rPr lang="en-US" sz="1900">
+              <a:rPr lang="en-US" sz="2100">
                 <a:effectLst/>
                 <a:latin typeface="Calibri" panose="020F0502020204030204" pitchFamily="34" charset="0"/>
                 <a:ea typeface="Calibri" panose="020F0502020204030204" pitchFamily="34" charset="0"/>
@@ -5011,7 +5011,7 @@
               </a:spcBef>
             </a:pPr>
             <a:r>
-              <a:rPr lang="en-US" sz="1900">
+              <a:rPr lang="en-US" sz="2100">
                 <a:effectLst/>
                 <a:latin typeface="Calibri" panose="020F0502020204030204" pitchFamily="34" charset="0"/>
                 <a:ea typeface="Calibri" panose="020F0502020204030204" pitchFamily="34" charset="0"/>
@@ -5040,7 +5040,7 @@
               </a:spcBef>
             </a:pPr>
             <a:r>
-              <a:rPr lang="en-US" sz="1900">
+              <a:rPr lang="en-US" sz="2100">
                 <a:effectLst/>
                 <a:latin typeface="Calibri" panose="020F0502020204030204" pitchFamily="34" charset="0"/>
                 <a:ea typeface="Calibri" panose="020F0502020204030204" pitchFamily="34" charset="0"/>
@@ -5048,14 +5048,14 @@
               <a:t>Lessons learned (Git, GitHub, and GitHub Classroom)</a:t>
             </a:r>
             <a:br>
-              <a:rPr lang="en-US" sz="1900">
+              <a:rPr lang="en-US" sz="2100">
                 <a:effectLst/>
                 <a:latin typeface="Calibri" panose="020F0502020204030204" pitchFamily="34" charset="0"/>
                 <a:ea typeface="Calibri" panose="020F0502020204030204" pitchFamily="34" charset="0"/>
               </a:rPr>
             </a:br>
             <a:r>
-              <a:rPr lang="en-US" sz="1900">
+              <a:rPr lang="en-US" sz="2100">
                 <a:effectLst/>
                 <a:latin typeface="Calibri" panose="020F0502020204030204" pitchFamily="34" charset="0"/>
                 <a:ea typeface="Calibri" panose="020F0502020204030204" pitchFamily="34" charset="0"/>
@@ -5063,7 +5063,7 @@
               <a:t>     </a:t>
             </a:r>
             <a:r>
-              <a:rPr lang="en-US" sz="1900" b="1">
+              <a:rPr lang="en-US" sz="2100" b="1">
                 <a:effectLst/>
                 <a:latin typeface="Calibri" panose="020F0502020204030204" pitchFamily="34" charset="0"/>
                 <a:ea typeface="Calibri" panose="020F0502020204030204" pitchFamily="34" charset="0"/>
@@ -5071,7 +5071,7 @@
               <a:t>(Create an account at </a:t>
             </a:r>
             <a:r>
-              <a:rPr lang="en-US" sz="1900" b="1" u="sng">
+              <a:rPr lang="en-US" sz="2100" b="1" u="sng">
                 <a:solidFill>
                   <a:srgbClr val="0563C1"/>
                 </a:solidFill>
@@ -5083,7 +5083,7 @@
               <a:t>https://github.com</a:t>
             </a:r>
             <a:r>
-              <a:rPr lang="en-US" sz="1900" b="1">
+              <a:rPr lang="en-US" sz="2100" b="1">
                 <a:effectLst/>
                 <a:latin typeface="Calibri" panose="020F0502020204030204" pitchFamily="34" charset="0"/>
                 <a:ea typeface="Calibri" panose="020F0502020204030204" pitchFamily="34" charset="0"/>
@@ -5091,7 +5091,7 @@
               <a:t>  and </a:t>
             </a:r>
             <a:r>
-              <a:rPr lang="en-US" sz="1900" b="1" u="sng">
+              <a:rPr lang="en-US" sz="2100" b="1" u="sng">
                 <a:solidFill>
                   <a:srgbClr val="0563C1"/>
                 </a:solidFill>
@@ -5103,14 +5103,14 @@
               <a:t>https://classroom.github.com</a:t>
             </a:r>
             <a:r>
-              <a:rPr lang="en-US" sz="1900" b="1">
+              <a:rPr lang="en-US" sz="2100" b="1">
                 <a:effectLst/>
                 <a:latin typeface="Calibri" panose="020F0502020204030204" pitchFamily="34" charset="0"/>
                 <a:ea typeface="Calibri" panose="020F0502020204030204" pitchFamily="34" charset="0"/>
               </a:rPr>
               <a:t> )</a:t>
             </a:r>
-            <a:endParaRPr lang="en-US" sz="1900">
+            <a:endParaRPr lang="en-US" sz="2100">
               <a:effectLst/>
               <a:latin typeface="Calibri" panose="020F0502020204030204" pitchFamily="34" charset="0"/>
               <a:ea typeface="Calibri" panose="020F0502020204030204" pitchFamily="34" charset="0"/>
@@ -5123,7 +5123,7 @@
               </a:spcBef>
             </a:pPr>
             <a:r>
-              <a:rPr lang="en-US" sz="1900">
+              <a:rPr lang="en-US" sz="2100">
                 <a:effectLst/>
                 <a:latin typeface="Calibri" panose="020F0502020204030204" pitchFamily="34" charset="0"/>
                 <a:ea typeface="Calibri" panose="020F0502020204030204" pitchFamily="34" charset="0"/>
@@ -5138,7 +5138,7 @@
               </a:spcBef>
             </a:pPr>
             <a:r>
-              <a:rPr lang="en-US" sz="1900">
+              <a:rPr lang="en-US" sz="2100">
                 <a:effectLst/>
                 <a:latin typeface="Calibri" panose="020F0502020204030204" pitchFamily="34" charset="0"/>
                 <a:ea typeface="Calibri" panose="020F0502020204030204" pitchFamily="34" charset="0"/>
@@ -5169,7 +5169,7 @@
         </p:nvSpPr>
         <p:spPr>
           <a:xfrm>
-            <a:off x="838200" y="446813"/>
+            <a:off x="838200" y="201712"/>
             <a:ext cx="10515600" cy="807026"/>
           </a:xfrm>
         </p:spPr>

</xml_diff>